<commit_message>
Update Battlebot 3 progress report.pptx
</commit_message>
<xml_diff>
--- a/Battlebot 3 progress report.pptx
+++ b/Battlebot 3 progress report.pptx
@@ -179,7 +179,7 @@
           <a:noFill/>
           <a:extLst>
             <a:ext uri="{909E8E84-426E-40dd-AFC4-6F175D3DCCD1}">
-              <a14:hiddenFill xmlns="" xmlns:a14="http://schemas.microsoft.com/office/drawing/2010/main">
+              <a14:hiddenFill xmlns:a14="http://schemas.microsoft.com/office/drawing/2010/main" xmlns="">
                 <a:solidFill>
                   <a:srgbClr val="FFFFFF"/>
                 </a:solidFill>
@@ -239,7 +239,7 @@
             </a:ln>
             <a:extLst>
               <a:ext uri="{91240B29-F687-4f45-9708-019B960494DF}">
-                <a14:hiddenLine xmlns="" xmlns:a14="http://schemas.microsoft.com/office/drawing/2010/main" w="9525">
+                <a14:hiddenLine xmlns:a14="http://schemas.microsoft.com/office/drawing/2010/main" xmlns="" w="9525">
                   <a:solidFill>
                     <a:srgbClr val="000000"/>
                   </a:solidFill>
@@ -329,7 +329,7 @@
             </a:ln>
             <a:extLst>
               <a:ext uri="{91240B29-F687-4f45-9708-019B960494DF}">
-                <a14:hiddenLine xmlns="" xmlns:a14="http://schemas.microsoft.com/office/drawing/2010/main" w="9525">
+                <a14:hiddenLine xmlns:a14="http://schemas.microsoft.com/office/drawing/2010/main" xmlns="" w="9525">
                   <a:solidFill>
                     <a:srgbClr val="000000"/>
                   </a:solidFill>
@@ -419,7 +419,7 @@
             </a:ln>
             <a:extLst>
               <a:ext uri="{91240B29-F687-4f45-9708-019B960494DF}">
-                <a14:hiddenLine xmlns="" xmlns:a14="http://schemas.microsoft.com/office/drawing/2010/main" w="9525">
+                <a14:hiddenLine xmlns:a14="http://schemas.microsoft.com/office/drawing/2010/main" xmlns="" w="9525">
                   <a:solidFill>
                     <a:srgbClr val="000000"/>
                   </a:solidFill>
@@ -453,7 +453,7 @@
             </a:ln>
             <a:extLst>
               <a:ext uri="{91240B29-F687-4f45-9708-019B960494DF}">
-                <a14:hiddenLine xmlns="" xmlns:a14="http://schemas.microsoft.com/office/drawing/2010/main" w="9525">
+                <a14:hiddenLine xmlns:a14="http://schemas.microsoft.com/office/drawing/2010/main" xmlns="" w="9525">
                   <a:solidFill>
                     <a:srgbClr val="000000"/>
                   </a:solidFill>
@@ -543,7 +543,7 @@
             </a:ln>
             <a:extLst>
               <a:ext uri="{91240B29-F687-4f45-9708-019B960494DF}">
-                <a14:hiddenLine xmlns="" xmlns:a14="http://schemas.microsoft.com/office/drawing/2010/main" w="9525">
+                <a14:hiddenLine xmlns:a14="http://schemas.microsoft.com/office/drawing/2010/main" xmlns="" w="9525">
                   <a:solidFill>
                     <a:srgbClr val="000000"/>
                   </a:solidFill>
@@ -605,7 +605,7 @@
             </a:ln>
             <a:extLst>
               <a:ext uri="{91240B29-F687-4f45-9708-019B960494DF}">
-                <a14:hiddenLine xmlns="" xmlns:a14="http://schemas.microsoft.com/office/drawing/2010/main" w="9525">
+                <a14:hiddenLine xmlns:a14="http://schemas.microsoft.com/office/drawing/2010/main" xmlns="" w="9525">
                   <a:solidFill>
                     <a:srgbClr val="000000"/>
                   </a:solidFill>
@@ -667,7 +667,7 @@
             </a:ln>
             <a:extLst>
               <a:ext uri="{91240B29-F687-4f45-9708-019B960494DF}">
-                <a14:hiddenLine xmlns="" xmlns:a14="http://schemas.microsoft.com/office/drawing/2010/main" w="9525">
+                <a14:hiddenLine xmlns:a14="http://schemas.microsoft.com/office/drawing/2010/main" xmlns="" w="9525">
                   <a:solidFill>
                     <a:srgbClr val="000000"/>
                   </a:solidFill>
@@ -757,7 +757,7 @@
             </a:ln>
             <a:extLst>
               <a:ext uri="{91240B29-F687-4f45-9708-019B960494DF}">
-                <a14:hiddenLine xmlns="" xmlns:a14="http://schemas.microsoft.com/office/drawing/2010/main" w="9525">
+                <a14:hiddenLine xmlns:a14="http://schemas.microsoft.com/office/drawing/2010/main" xmlns="" w="9525">
                   <a:solidFill>
                     <a:srgbClr val="000000"/>
                   </a:solidFill>
@@ -819,7 +819,7 @@
             </a:ln>
             <a:extLst>
               <a:ext uri="{91240B29-F687-4f45-9708-019B960494DF}">
-                <a14:hiddenLine xmlns="" xmlns:a14="http://schemas.microsoft.com/office/drawing/2010/main" w="9525">
+                <a14:hiddenLine xmlns:a14="http://schemas.microsoft.com/office/drawing/2010/main" xmlns="" w="9525">
                   <a:solidFill>
                     <a:srgbClr val="000000"/>
                   </a:solidFill>
@@ -881,7 +881,7 @@
             </a:ln>
             <a:extLst>
               <a:ext uri="{91240B29-F687-4f45-9708-019B960494DF}">
-                <a14:hiddenLine xmlns="" xmlns:a14="http://schemas.microsoft.com/office/drawing/2010/main" w="9525">
+                <a14:hiddenLine xmlns:a14="http://schemas.microsoft.com/office/drawing/2010/main" xmlns="" w="9525">
                   <a:solidFill>
                     <a:srgbClr val="000000"/>
                   </a:solidFill>
@@ -971,7 +971,7 @@
             </a:ln>
             <a:extLst>
               <a:ext uri="{91240B29-F687-4f45-9708-019B960494DF}">
-                <a14:hiddenLine xmlns="" xmlns:a14="http://schemas.microsoft.com/office/drawing/2010/main" w="9525">
+                <a14:hiddenLine xmlns:a14="http://schemas.microsoft.com/office/drawing/2010/main" xmlns="" w="9525">
                   <a:solidFill>
                     <a:srgbClr val="000000"/>
                   </a:solidFill>
@@ -1061,7 +1061,7 @@
             </a:ln>
             <a:extLst>
               <a:ext uri="{91240B29-F687-4f45-9708-019B960494DF}">
-                <a14:hiddenLine xmlns="" xmlns:a14="http://schemas.microsoft.com/office/drawing/2010/main" w="9525">
+                <a14:hiddenLine xmlns:a14="http://schemas.microsoft.com/office/drawing/2010/main" xmlns="" w="9525">
                   <a:solidFill>
                     <a:srgbClr val="000000"/>
                   </a:solidFill>
@@ -1123,7 +1123,7 @@
             </a:ln>
             <a:extLst>
               <a:ext uri="{91240B29-F687-4f45-9708-019B960494DF}">
-                <a14:hiddenLine xmlns="" xmlns:a14="http://schemas.microsoft.com/office/drawing/2010/main" w="9525">
+                <a14:hiddenLine xmlns:a14="http://schemas.microsoft.com/office/drawing/2010/main" xmlns="" w="9525">
                   <a:solidFill>
                     <a:srgbClr val="000000"/>
                   </a:solidFill>
@@ -1233,7 +1233,7 @@
             </a:ln>
             <a:extLst>
               <a:ext uri="{91240B29-F687-4f45-9708-019B960494DF}">
-                <a14:hiddenLine xmlns="" xmlns:a14="http://schemas.microsoft.com/office/drawing/2010/main" w="9525">
+                <a14:hiddenLine xmlns:a14="http://schemas.microsoft.com/office/drawing/2010/main" xmlns="" w="9525">
                   <a:solidFill>
                     <a:srgbClr val="000000"/>
                   </a:solidFill>
@@ -1295,7 +1295,7 @@
             </a:ln>
             <a:extLst>
               <a:ext uri="{91240B29-F687-4f45-9708-019B960494DF}">
-                <a14:hiddenLine xmlns="" xmlns:a14="http://schemas.microsoft.com/office/drawing/2010/main" w="9525">
+                <a14:hiddenLine xmlns:a14="http://schemas.microsoft.com/office/drawing/2010/main" xmlns="" w="9525">
                   <a:solidFill>
                     <a:srgbClr val="000000"/>
                   </a:solidFill>
@@ -1385,7 +1385,7 @@
             </a:ln>
             <a:extLst>
               <a:ext uri="{91240B29-F687-4f45-9708-019B960494DF}">
-                <a14:hiddenLine xmlns="" xmlns:a14="http://schemas.microsoft.com/office/drawing/2010/main" w="9525">
+                <a14:hiddenLine xmlns:a14="http://schemas.microsoft.com/office/drawing/2010/main" xmlns="" w="9525">
                   <a:solidFill>
                     <a:srgbClr val="000000"/>
                   </a:solidFill>
@@ -1475,7 +1475,7 @@
             </a:ln>
             <a:extLst>
               <a:ext uri="{91240B29-F687-4f45-9708-019B960494DF}">
-                <a14:hiddenLine xmlns="" xmlns:a14="http://schemas.microsoft.com/office/drawing/2010/main" w="9525">
+                <a14:hiddenLine xmlns:a14="http://schemas.microsoft.com/office/drawing/2010/main" xmlns="" w="9525">
                   <a:solidFill>
                     <a:srgbClr val="000000"/>
                   </a:solidFill>
@@ -1537,7 +1537,7 @@
             </a:ln>
             <a:extLst>
               <a:ext uri="{91240B29-F687-4f45-9708-019B960494DF}">
-                <a14:hiddenLine xmlns="" xmlns:a14="http://schemas.microsoft.com/office/drawing/2010/main" w="9525">
+                <a14:hiddenLine xmlns:a14="http://schemas.microsoft.com/office/drawing/2010/main" xmlns="" w="9525">
                   <a:solidFill>
                     <a:srgbClr val="000000"/>
                   </a:solidFill>
@@ -1627,7 +1627,7 @@
             </a:ln>
             <a:extLst>
               <a:ext uri="{91240B29-F687-4f45-9708-019B960494DF}">
-                <a14:hiddenLine xmlns="" xmlns:a14="http://schemas.microsoft.com/office/drawing/2010/main" w="9525">
+                <a14:hiddenLine xmlns:a14="http://schemas.microsoft.com/office/drawing/2010/main" xmlns="" w="9525">
                   <a:solidFill>
                     <a:srgbClr val="000000"/>
                   </a:solidFill>
@@ -1717,7 +1717,7 @@
             </a:ln>
             <a:extLst>
               <a:ext uri="{91240B29-F687-4f45-9708-019B960494DF}">
-                <a14:hiddenLine xmlns="" xmlns:a14="http://schemas.microsoft.com/office/drawing/2010/main" w="9525">
+                <a14:hiddenLine xmlns:a14="http://schemas.microsoft.com/office/drawing/2010/main" xmlns="" w="9525">
                   <a:solidFill>
                     <a:srgbClr val="000000"/>
                   </a:solidFill>
@@ -1773,7 +1773,7 @@
             </a:ln>
             <a:extLst>
               <a:ext uri="{91240B29-F687-4f45-9708-019B960494DF}">
-                <a14:hiddenLine xmlns="" xmlns:a14="http://schemas.microsoft.com/office/drawing/2010/main" w="9525">
+                <a14:hiddenLine xmlns:a14="http://schemas.microsoft.com/office/drawing/2010/main" xmlns="" w="9525">
                   <a:solidFill>
                     <a:srgbClr val="000000"/>
                   </a:solidFill>
@@ -1863,7 +1863,7 @@
             </a:ln>
             <a:extLst>
               <a:ext uri="{91240B29-F687-4f45-9708-019B960494DF}">
-                <a14:hiddenLine xmlns="" xmlns:a14="http://schemas.microsoft.com/office/drawing/2010/main" w="9525">
+                <a14:hiddenLine xmlns:a14="http://schemas.microsoft.com/office/drawing/2010/main" xmlns="" w="9525">
                   <a:solidFill>
                     <a:srgbClr val="000000"/>
                   </a:solidFill>
@@ -1919,7 +1919,7 @@
             </a:ln>
             <a:extLst>
               <a:ext uri="{91240B29-F687-4f45-9708-019B960494DF}">
-                <a14:hiddenLine xmlns="" xmlns:a14="http://schemas.microsoft.com/office/drawing/2010/main" w="9525">
+                <a14:hiddenLine xmlns:a14="http://schemas.microsoft.com/office/drawing/2010/main" xmlns="" w="9525">
                   <a:solidFill>
                     <a:srgbClr val="000000"/>
                   </a:solidFill>
@@ -2009,7 +2009,7 @@
             </a:ln>
             <a:extLst>
               <a:ext uri="{91240B29-F687-4f45-9708-019B960494DF}">
-                <a14:hiddenLine xmlns="" xmlns:a14="http://schemas.microsoft.com/office/drawing/2010/main" w="9525">
+                <a14:hiddenLine xmlns:a14="http://schemas.microsoft.com/office/drawing/2010/main" xmlns="" w="9525">
                   <a:solidFill>
                     <a:srgbClr val="000000"/>
                   </a:solidFill>
@@ -2077,7 +2077,7 @@
             </a:ln>
             <a:extLst>
               <a:ext uri="{91240B29-F687-4f45-9708-019B960494DF}">
-                <a14:hiddenLine xmlns="" xmlns:a14="http://schemas.microsoft.com/office/drawing/2010/main" w="9525">
+                <a14:hiddenLine xmlns:a14="http://schemas.microsoft.com/office/drawing/2010/main" xmlns="" w="9525">
                   <a:solidFill>
                     <a:srgbClr val="000000"/>
                   </a:solidFill>
@@ -2167,7 +2167,7 @@
             </a:ln>
             <a:extLst>
               <a:ext uri="{91240B29-F687-4f45-9708-019B960494DF}">
-                <a14:hiddenLine xmlns="" xmlns:a14="http://schemas.microsoft.com/office/drawing/2010/main" w="9525">
+                <a14:hiddenLine xmlns:a14="http://schemas.microsoft.com/office/drawing/2010/main" xmlns="" w="9525">
                   <a:solidFill>
                     <a:srgbClr val="000000"/>
                   </a:solidFill>
@@ -2235,7 +2235,7 @@
             </a:ln>
             <a:extLst>
               <a:ext uri="{91240B29-F687-4f45-9708-019B960494DF}">
-                <a14:hiddenLine xmlns="" xmlns:a14="http://schemas.microsoft.com/office/drawing/2010/main" w="9525">
+                <a14:hiddenLine xmlns:a14="http://schemas.microsoft.com/office/drawing/2010/main" xmlns="" w="9525">
                   <a:solidFill>
                     <a:srgbClr val="000000"/>
                   </a:solidFill>
@@ -2325,7 +2325,7 @@
             </a:ln>
             <a:extLst>
               <a:ext uri="{91240B29-F687-4f45-9708-019B960494DF}">
-                <a14:hiddenLine xmlns="" xmlns:a14="http://schemas.microsoft.com/office/drawing/2010/main" w="9525">
+                <a14:hiddenLine xmlns:a14="http://schemas.microsoft.com/office/drawing/2010/main" xmlns="" w="9525">
                   <a:solidFill>
                     <a:srgbClr val="000000"/>
                   </a:solidFill>
@@ -2359,7 +2359,7 @@
             </a:ln>
             <a:extLst>
               <a:ext uri="{91240B29-F687-4f45-9708-019B960494DF}">
-                <a14:hiddenLine xmlns="" xmlns:a14="http://schemas.microsoft.com/office/drawing/2010/main" w="9525">
+                <a14:hiddenLine xmlns:a14="http://schemas.microsoft.com/office/drawing/2010/main" xmlns="" w="9525">
                   <a:solidFill>
                     <a:srgbClr val="000000"/>
                   </a:solidFill>
@@ -2449,7 +2449,7 @@
             </a:ln>
             <a:extLst>
               <a:ext uri="{91240B29-F687-4f45-9708-019B960494DF}">
-                <a14:hiddenLine xmlns="" xmlns:a14="http://schemas.microsoft.com/office/drawing/2010/main" w="9525">
+                <a14:hiddenLine xmlns:a14="http://schemas.microsoft.com/office/drawing/2010/main" xmlns="" w="9525">
                   <a:solidFill>
                     <a:srgbClr val="000000"/>
                   </a:solidFill>
@@ -2511,7 +2511,7 @@
             </a:ln>
             <a:extLst>
               <a:ext uri="{91240B29-F687-4f45-9708-019B960494DF}">
-                <a14:hiddenLine xmlns="" xmlns:a14="http://schemas.microsoft.com/office/drawing/2010/main" w="9525">
+                <a14:hiddenLine xmlns:a14="http://schemas.microsoft.com/office/drawing/2010/main" xmlns="" w="9525">
                   <a:solidFill>
                     <a:srgbClr val="000000"/>
                   </a:solidFill>
@@ -2573,7 +2573,7 @@
             </a:ln>
             <a:extLst>
               <a:ext uri="{91240B29-F687-4f45-9708-019B960494DF}">
-                <a14:hiddenLine xmlns="" xmlns:a14="http://schemas.microsoft.com/office/drawing/2010/main" w="9525">
+                <a14:hiddenLine xmlns:a14="http://schemas.microsoft.com/office/drawing/2010/main" xmlns="" w="9525">
                   <a:solidFill>
                     <a:srgbClr val="000000"/>
                   </a:solidFill>
@@ -2663,7 +2663,7 @@
             </a:ln>
             <a:extLst>
               <a:ext uri="{91240B29-F687-4f45-9708-019B960494DF}">
-                <a14:hiddenLine xmlns="" xmlns:a14="http://schemas.microsoft.com/office/drawing/2010/main" w="9525">
+                <a14:hiddenLine xmlns:a14="http://schemas.microsoft.com/office/drawing/2010/main" xmlns="" w="9525">
                   <a:solidFill>
                     <a:srgbClr val="000000"/>
                   </a:solidFill>
@@ -2731,7 +2731,7 @@
             </a:ln>
             <a:extLst>
               <a:ext uri="{91240B29-F687-4f45-9708-019B960494DF}">
-                <a14:hiddenLine xmlns="" xmlns:a14="http://schemas.microsoft.com/office/drawing/2010/main" w="9525">
+                <a14:hiddenLine xmlns:a14="http://schemas.microsoft.com/office/drawing/2010/main" xmlns="" w="9525">
                   <a:solidFill>
                     <a:srgbClr val="000000"/>
                   </a:solidFill>
@@ -2793,7 +2793,7 @@
             </a:ln>
             <a:extLst>
               <a:ext uri="{91240B29-F687-4f45-9708-019B960494DF}">
-                <a14:hiddenLine xmlns="" xmlns:a14="http://schemas.microsoft.com/office/drawing/2010/main" w="9525">
+                <a14:hiddenLine xmlns:a14="http://schemas.microsoft.com/office/drawing/2010/main" xmlns="" w="9525">
                   <a:solidFill>
                     <a:srgbClr val="000000"/>
                   </a:solidFill>
@@ -2883,7 +2883,7 @@
             </a:ln>
             <a:extLst>
               <a:ext uri="{91240B29-F687-4f45-9708-019B960494DF}">
-                <a14:hiddenLine xmlns="" xmlns:a14="http://schemas.microsoft.com/office/drawing/2010/main" w="9525">
+                <a14:hiddenLine xmlns:a14="http://schemas.microsoft.com/office/drawing/2010/main" xmlns="" w="9525">
                   <a:solidFill>
                     <a:srgbClr val="000000"/>
                   </a:solidFill>
@@ -2945,7 +2945,7 @@
             </a:ln>
             <a:extLst>
               <a:ext uri="{91240B29-F687-4f45-9708-019B960494DF}">
-                <a14:hiddenLine xmlns="" xmlns:a14="http://schemas.microsoft.com/office/drawing/2010/main" w="9525">
+                <a14:hiddenLine xmlns:a14="http://schemas.microsoft.com/office/drawing/2010/main" xmlns="" w="9525">
                   <a:solidFill>
                     <a:srgbClr val="000000"/>
                   </a:solidFill>
@@ -3035,7 +3035,7 @@
             </a:ln>
             <a:extLst>
               <a:ext uri="{91240B29-F687-4f45-9708-019B960494DF}">
-                <a14:hiddenLine xmlns="" xmlns:a14="http://schemas.microsoft.com/office/drawing/2010/main" w="9525">
+                <a14:hiddenLine xmlns:a14="http://schemas.microsoft.com/office/drawing/2010/main" xmlns="" w="9525">
                   <a:solidFill>
                     <a:srgbClr val="000000"/>
                   </a:solidFill>
@@ -3097,7 +3097,7 @@
             </a:ln>
             <a:extLst>
               <a:ext uri="{91240B29-F687-4f45-9708-019B960494DF}">
-                <a14:hiddenLine xmlns="" xmlns:a14="http://schemas.microsoft.com/office/drawing/2010/main" w="9525">
+                <a14:hiddenLine xmlns:a14="http://schemas.microsoft.com/office/drawing/2010/main" xmlns="" w="9525">
                   <a:solidFill>
                     <a:srgbClr val="000000"/>
                   </a:solidFill>
@@ -3187,7 +3187,7 @@
             </a:ln>
             <a:extLst>
               <a:ext uri="{91240B29-F687-4f45-9708-019B960494DF}">
-                <a14:hiddenLine xmlns="" xmlns:a14="http://schemas.microsoft.com/office/drawing/2010/main" w="9525">
+                <a14:hiddenLine xmlns:a14="http://schemas.microsoft.com/office/drawing/2010/main" xmlns="" w="9525">
                   <a:solidFill>
                     <a:srgbClr val="000000"/>
                   </a:solidFill>
@@ -3221,7 +3221,7 @@
             </a:ln>
             <a:extLst>
               <a:ext uri="{91240B29-F687-4f45-9708-019B960494DF}">
-                <a14:hiddenLine xmlns="" xmlns:a14="http://schemas.microsoft.com/office/drawing/2010/main" w="9525">
+                <a14:hiddenLine xmlns:a14="http://schemas.microsoft.com/office/drawing/2010/main" xmlns="" w="9525">
                   <a:solidFill>
                     <a:srgbClr val="000000"/>
                   </a:solidFill>
@@ -3286,7 +3286,7 @@
             </a:ln>
             <a:extLst>
               <a:ext uri="{91240B29-F687-4f45-9708-019B960494DF}">
-                <a14:hiddenLine xmlns="" xmlns:a14="http://schemas.microsoft.com/office/drawing/2010/main" w="9525">
+                <a14:hiddenLine xmlns:a14="http://schemas.microsoft.com/office/drawing/2010/main" xmlns="" w="9525">
                   <a:solidFill>
                     <a:srgbClr val="000000"/>
                   </a:solidFill>
@@ -3376,7 +3376,7 @@
             </a:ln>
             <a:extLst>
               <a:ext uri="{91240B29-F687-4f45-9708-019B960494DF}">
-                <a14:hiddenLine xmlns="" xmlns:a14="http://schemas.microsoft.com/office/drawing/2010/main" w="9525">
+                <a14:hiddenLine xmlns:a14="http://schemas.microsoft.com/office/drawing/2010/main" xmlns="" w="9525">
                   <a:solidFill>
                     <a:srgbClr val="000000"/>
                   </a:solidFill>
@@ -3438,7 +3438,7 @@
             </a:ln>
             <a:extLst>
               <a:ext uri="{91240B29-F687-4f45-9708-019B960494DF}">
-                <a14:hiddenLine xmlns="" xmlns:a14="http://schemas.microsoft.com/office/drawing/2010/main" w="9525">
+                <a14:hiddenLine xmlns:a14="http://schemas.microsoft.com/office/drawing/2010/main" xmlns="" w="9525">
                   <a:solidFill>
                     <a:srgbClr val="000000"/>
                   </a:solidFill>
@@ -3528,7 +3528,7 @@
             </a:ln>
             <a:extLst>
               <a:ext uri="{91240B29-F687-4f45-9708-019B960494DF}">
-                <a14:hiddenLine xmlns="" xmlns:a14="http://schemas.microsoft.com/office/drawing/2010/main" w="9525">
+                <a14:hiddenLine xmlns:a14="http://schemas.microsoft.com/office/drawing/2010/main" xmlns="" w="9525">
                   <a:solidFill>
                     <a:srgbClr val="000000"/>
                   </a:solidFill>
@@ -3618,7 +3618,7 @@
             </a:ln>
             <a:extLst>
               <a:ext uri="{91240B29-F687-4f45-9708-019B960494DF}">
-                <a14:hiddenLine xmlns="" xmlns:a14="http://schemas.microsoft.com/office/drawing/2010/main" w="9525">
+                <a14:hiddenLine xmlns:a14="http://schemas.microsoft.com/office/drawing/2010/main" xmlns="" w="9525">
                   <a:solidFill>
                     <a:srgbClr val="000000"/>
                   </a:solidFill>
@@ -3683,7 +3683,7 @@
             </a:ln>
             <a:extLst>
               <a:ext uri="{91240B29-F687-4f45-9708-019B960494DF}">
-                <a14:hiddenLine xmlns="" xmlns:a14="http://schemas.microsoft.com/office/drawing/2010/main" w="9525">
+                <a14:hiddenLine xmlns:a14="http://schemas.microsoft.com/office/drawing/2010/main" xmlns="" w="9525">
                   <a:solidFill>
                     <a:srgbClr val="000000"/>
                   </a:solidFill>
@@ -3745,7 +3745,7 @@
             </a:ln>
             <a:extLst>
               <a:ext uri="{91240B29-F687-4f45-9708-019B960494DF}">
-                <a14:hiddenLine xmlns="" xmlns:a14="http://schemas.microsoft.com/office/drawing/2010/main" w="9525">
+                <a14:hiddenLine xmlns:a14="http://schemas.microsoft.com/office/drawing/2010/main" xmlns="" w="9525">
                   <a:solidFill>
                     <a:srgbClr val="000000"/>
                   </a:solidFill>
@@ -3835,7 +3835,7 @@
             </a:ln>
             <a:extLst>
               <a:ext uri="{91240B29-F687-4f45-9708-019B960494DF}">
-                <a14:hiddenLine xmlns="" xmlns:a14="http://schemas.microsoft.com/office/drawing/2010/main" w="9525">
+                <a14:hiddenLine xmlns:a14="http://schemas.microsoft.com/office/drawing/2010/main" xmlns="" w="9525">
                   <a:solidFill>
                     <a:srgbClr val="000000"/>
                   </a:solidFill>
@@ -3925,7 +3925,7 @@
             </a:ln>
             <a:extLst>
               <a:ext uri="{91240B29-F687-4f45-9708-019B960494DF}">
-                <a14:hiddenLine xmlns="" xmlns:a14="http://schemas.microsoft.com/office/drawing/2010/main" w="9525">
+                <a14:hiddenLine xmlns:a14="http://schemas.microsoft.com/office/drawing/2010/main" xmlns="" w="9525">
                   <a:solidFill>
                     <a:srgbClr val="000000"/>
                   </a:solidFill>
@@ -3987,7 +3987,7 @@
             </a:ln>
             <a:extLst>
               <a:ext uri="{91240B29-F687-4f45-9708-019B960494DF}">
-                <a14:hiddenLine xmlns="" xmlns:a14="http://schemas.microsoft.com/office/drawing/2010/main" w="9525">
+                <a14:hiddenLine xmlns:a14="http://schemas.microsoft.com/office/drawing/2010/main" xmlns="" w="9525">
                   <a:solidFill>
                     <a:srgbClr val="000000"/>
                   </a:solidFill>
@@ -4107,7 +4107,7 @@
             </a:ln>
             <a:extLst>
               <a:ext uri="{91240B29-F687-4f45-9708-019B960494DF}">
-                <a14:hiddenLine xmlns="" xmlns:a14="http://schemas.microsoft.com/office/drawing/2010/main" w="9525">
+                <a14:hiddenLine xmlns:a14="http://schemas.microsoft.com/office/drawing/2010/main" xmlns="" w="9525">
                   <a:solidFill>
                     <a:srgbClr val="000000"/>
                   </a:solidFill>
@@ -4175,7 +4175,7 @@
             </a:ln>
             <a:extLst>
               <a:ext uri="{91240B29-F687-4f45-9708-019B960494DF}">
-                <a14:hiddenLine xmlns="" xmlns:a14="http://schemas.microsoft.com/office/drawing/2010/main" w="9525">
+                <a14:hiddenLine xmlns:a14="http://schemas.microsoft.com/office/drawing/2010/main" xmlns="" w="9525">
                   <a:solidFill>
                     <a:srgbClr val="000000"/>
                   </a:solidFill>
@@ -4265,7 +4265,7 @@
             </a:ln>
             <a:extLst>
               <a:ext uri="{91240B29-F687-4f45-9708-019B960494DF}">
-                <a14:hiddenLine xmlns="" xmlns:a14="http://schemas.microsoft.com/office/drawing/2010/main" w="9525">
+                <a14:hiddenLine xmlns:a14="http://schemas.microsoft.com/office/drawing/2010/main" xmlns="" w="9525">
                   <a:solidFill>
                     <a:srgbClr val="000000"/>
                   </a:solidFill>
@@ -8994,7 +8994,7 @@
           <a:noFill/>
           <a:extLst>
             <a:ext uri="{909E8E84-426E-40dd-AFC4-6F175D3DCCD1}">
-              <a14:hiddenFill xmlns="" xmlns:a14="http://schemas.microsoft.com/office/drawing/2010/main">
+              <a14:hiddenFill xmlns:a14="http://schemas.microsoft.com/office/drawing/2010/main" xmlns="">
                 <a:solidFill>
                   <a:srgbClr val="FFFFFF"/>
                 </a:solidFill>
@@ -9068,7 +9068,7 @@
               </a:ln>
               <a:extLst>
                 <a:ext uri="{91240B29-F687-4f45-9708-019B960494DF}">
-                  <a14:hiddenLine xmlns="" xmlns:a14="http://schemas.microsoft.com/office/drawing/2010/main" w="9525">
+                  <a14:hiddenLine xmlns:a14="http://schemas.microsoft.com/office/drawing/2010/main" xmlns="" w="9525">
                     <a:solidFill>
                       <a:srgbClr val="000000"/>
                     </a:solidFill>
@@ -9158,7 +9158,7 @@
               </a:ln>
               <a:extLst>
                 <a:ext uri="{91240B29-F687-4f45-9708-019B960494DF}">
-                  <a14:hiddenLine xmlns="" xmlns:a14="http://schemas.microsoft.com/office/drawing/2010/main" w="9525">
+                  <a14:hiddenLine xmlns:a14="http://schemas.microsoft.com/office/drawing/2010/main" xmlns="" w="9525">
                     <a:solidFill>
                       <a:srgbClr val="000000"/>
                     </a:solidFill>
@@ -9248,7 +9248,7 @@
               </a:ln>
               <a:extLst>
                 <a:ext uri="{91240B29-F687-4f45-9708-019B960494DF}">
-                  <a14:hiddenLine xmlns="" xmlns:a14="http://schemas.microsoft.com/office/drawing/2010/main" w="9525">
+                  <a14:hiddenLine xmlns:a14="http://schemas.microsoft.com/office/drawing/2010/main" xmlns="" w="9525">
                     <a:solidFill>
                       <a:srgbClr val="000000"/>
                     </a:solidFill>
@@ -9310,7 +9310,7 @@
               </a:ln>
               <a:extLst>
                 <a:ext uri="{91240B29-F687-4f45-9708-019B960494DF}">
-                  <a14:hiddenLine xmlns="" xmlns:a14="http://schemas.microsoft.com/office/drawing/2010/main" w="9525">
+                  <a14:hiddenLine xmlns:a14="http://schemas.microsoft.com/office/drawing/2010/main" xmlns="" w="9525">
                     <a:solidFill>
                       <a:srgbClr val="000000"/>
                     </a:solidFill>
@@ -9400,7 +9400,7 @@
               </a:ln>
               <a:extLst>
                 <a:ext uri="{91240B29-F687-4f45-9708-019B960494DF}">
-                  <a14:hiddenLine xmlns="" xmlns:a14="http://schemas.microsoft.com/office/drawing/2010/main" w="9525">
+                  <a14:hiddenLine xmlns:a14="http://schemas.microsoft.com/office/drawing/2010/main" xmlns="" w="9525">
                     <a:solidFill>
                       <a:srgbClr val="000000"/>
                     </a:solidFill>
@@ -9462,7 +9462,7 @@
               </a:ln>
               <a:extLst>
                 <a:ext uri="{91240B29-F687-4f45-9708-019B960494DF}">
-                  <a14:hiddenLine xmlns="" xmlns:a14="http://schemas.microsoft.com/office/drawing/2010/main" w="9525">
+                  <a14:hiddenLine xmlns:a14="http://schemas.microsoft.com/office/drawing/2010/main" xmlns="" w="9525">
                     <a:solidFill>
                       <a:srgbClr val="000000"/>
                     </a:solidFill>
@@ -9524,7 +9524,7 @@
               </a:ln>
               <a:extLst>
                 <a:ext uri="{91240B29-F687-4f45-9708-019B960494DF}">
-                  <a14:hiddenLine xmlns="" xmlns:a14="http://schemas.microsoft.com/office/drawing/2010/main" w="9525">
+                  <a14:hiddenLine xmlns:a14="http://schemas.microsoft.com/office/drawing/2010/main" xmlns="" w="9525">
                     <a:solidFill>
                       <a:srgbClr val="000000"/>
                     </a:solidFill>
@@ -9614,7 +9614,7 @@
               </a:ln>
               <a:extLst>
                 <a:ext uri="{91240B29-F687-4f45-9708-019B960494DF}">
-                  <a14:hiddenLine xmlns="" xmlns:a14="http://schemas.microsoft.com/office/drawing/2010/main" w="9525">
+                  <a14:hiddenLine xmlns:a14="http://schemas.microsoft.com/office/drawing/2010/main" xmlns="" w="9525">
                     <a:solidFill>
                       <a:srgbClr val="000000"/>
                     </a:solidFill>
@@ -9704,7 +9704,7 @@
               </a:ln>
               <a:extLst>
                 <a:ext uri="{91240B29-F687-4f45-9708-019B960494DF}">
-                  <a14:hiddenLine xmlns="" xmlns:a14="http://schemas.microsoft.com/office/drawing/2010/main" w="9525">
+                  <a14:hiddenLine xmlns:a14="http://schemas.microsoft.com/office/drawing/2010/main" xmlns="" w="9525">
                     <a:solidFill>
                       <a:srgbClr val="000000"/>
                     </a:solidFill>
@@ -9766,7 +9766,7 @@
               </a:ln>
               <a:extLst>
                 <a:ext uri="{91240B29-F687-4f45-9708-019B960494DF}">
-                  <a14:hiddenLine xmlns="" xmlns:a14="http://schemas.microsoft.com/office/drawing/2010/main" w="9525">
+                  <a14:hiddenLine xmlns:a14="http://schemas.microsoft.com/office/drawing/2010/main" xmlns="" w="9525">
                     <a:solidFill>
                       <a:srgbClr val="000000"/>
                     </a:solidFill>
@@ -9876,7 +9876,7 @@
               </a:ln>
               <a:extLst>
                 <a:ext uri="{91240B29-F687-4f45-9708-019B960494DF}">
-                  <a14:hiddenLine xmlns="" xmlns:a14="http://schemas.microsoft.com/office/drawing/2010/main" w="9525">
+                  <a14:hiddenLine xmlns:a14="http://schemas.microsoft.com/office/drawing/2010/main" xmlns="" w="9525">
                     <a:solidFill>
                       <a:srgbClr val="000000"/>
                     </a:solidFill>
@@ -9960,7 +9960,7 @@
               </a:ln>
               <a:extLst>
                 <a:ext uri="{91240B29-F687-4f45-9708-019B960494DF}">
-                  <a14:hiddenLine xmlns="" xmlns:a14="http://schemas.microsoft.com/office/drawing/2010/main" w="9525">
+                  <a14:hiddenLine xmlns:a14="http://schemas.microsoft.com/office/drawing/2010/main" xmlns="" w="9525">
                     <a:solidFill>
                       <a:srgbClr val="000000"/>
                     </a:solidFill>
@@ -10022,7 +10022,7 @@
               </a:ln>
               <a:extLst>
                 <a:ext uri="{91240B29-F687-4f45-9708-019B960494DF}">
-                  <a14:hiddenLine xmlns="" xmlns:a14="http://schemas.microsoft.com/office/drawing/2010/main" w="9525">
+                  <a14:hiddenLine xmlns:a14="http://schemas.microsoft.com/office/drawing/2010/main" xmlns="" w="9525">
                     <a:solidFill>
                       <a:srgbClr val="000000"/>
                     </a:solidFill>
@@ -10084,7 +10084,7 @@
               </a:ln>
               <a:extLst>
                 <a:ext uri="{91240B29-F687-4f45-9708-019B960494DF}">
-                  <a14:hiddenLine xmlns="" xmlns:a14="http://schemas.microsoft.com/office/drawing/2010/main" w="9525">
+                  <a14:hiddenLine xmlns:a14="http://schemas.microsoft.com/office/drawing/2010/main" xmlns="" w="9525">
                     <a:solidFill>
                       <a:srgbClr val="000000"/>
                     </a:solidFill>
@@ -10174,7 +10174,7 @@
               </a:ln>
               <a:extLst>
                 <a:ext uri="{91240B29-F687-4f45-9708-019B960494DF}">
-                  <a14:hiddenLine xmlns="" xmlns:a14="http://schemas.microsoft.com/office/drawing/2010/main" w="9525">
+                  <a14:hiddenLine xmlns:a14="http://schemas.microsoft.com/office/drawing/2010/main" xmlns="" w="9525">
                     <a:solidFill>
                       <a:srgbClr val="000000"/>
                     </a:solidFill>
@@ -10208,7 +10208,7 @@
               </a:ln>
               <a:extLst>
                 <a:ext uri="{91240B29-F687-4f45-9708-019B960494DF}">
-                  <a14:hiddenLine xmlns="" xmlns:a14="http://schemas.microsoft.com/office/drawing/2010/main" w="9525">
+                  <a14:hiddenLine xmlns:a14="http://schemas.microsoft.com/office/drawing/2010/main" xmlns="" w="9525">
                     <a:solidFill>
                       <a:srgbClr val="000000"/>
                     </a:solidFill>
@@ -10273,7 +10273,7 @@
               </a:ln>
               <a:extLst>
                 <a:ext uri="{91240B29-F687-4f45-9708-019B960494DF}">
-                  <a14:hiddenLine xmlns="" xmlns:a14="http://schemas.microsoft.com/office/drawing/2010/main" w="9525">
+                  <a14:hiddenLine xmlns:a14="http://schemas.microsoft.com/office/drawing/2010/main" xmlns="" w="9525">
                     <a:solidFill>
                       <a:srgbClr val="000000"/>
                     </a:solidFill>
@@ -10363,7 +10363,7 @@
               </a:ln>
               <a:extLst>
                 <a:ext uri="{91240B29-F687-4f45-9708-019B960494DF}">
-                  <a14:hiddenLine xmlns="" xmlns:a14="http://schemas.microsoft.com/office/drawing/2010/main" w="9525">
+                  <a14:hiddenLine xmlns:a14="http://schemas.microsoft.com/office/drawing/2010/main" xmlns="" w="9525">
                     <a:solidFill>
                       <a:srgbClr val="000000"/>
                     </a:solidFill>
@@ -10425,7 +10425,7 @@
               </a:ln>
               <a:extLst>
                 <a:ext uri="{91240B29-F687-4f45-9708-019B960494DF}">
-                  <a14:hiddenLine xmlns="" xmlns:a14="http://schemas.microsoft.com/office/drawing/2010/main" w="9525">
+                  <a14:hiddenLine xmlns:a14="http://schemas.microsoft.com/office/drawing/2010/main" xmlns="" w="9525">
                     <a:solidFill>
                       <a:srgbClr val="000000"/>
                     </a:solidFill>
@@ -10515,7 +10515,7 @@
               </a:ln>
               <a:extLst>
                 <a:ext uri="{91240B29-F687-4f45-9708-019B960494DF}">
-                  <a14:hiddenLine xmlns="" xmlns:a14="http://schemas.microsoft.com/office/drawing/2010/main" w="9525">
+                  <a14:hiddenLine xmlns:a14="http://schemas.microsoft.com/office/drawing/2010/main" xmlns="" w="9525">
                     <a:solidFill>
                       <a:srgbClr val="000000"/>
                     </a:solidFill>
@@ -10580,7 +10580,7 @@
               </a:ln>
               <a:extLst>
                 <a:ext uri="{91240B29-F687-4f45-9708-019B960494DF}">
-                  <a14:hiddenLine xmlns="" xmlns:a14="http://schemas.microsoft.com/office/drawing/2010/main" w="9525">
+                  <a14:hiddenLine xmlns:a14="http://schemas.microsoft.com/office/drawing/2010/main" xmlns="" w="9525">
                     <a:solidFill>
                       <a:srgbClr val="000000"/>
                     </a:solidFill>
@@ -10642,7 +10642,7 @@
               </a:ln>
               <a:extLst>
                 <a:ext uri="{91240B29-F687-4f45-9708-019B960494DF}">
-                  <a14:hiddenLine xmlns="" xmlns:a14="http://schemas.microsoft.com/office/drawing/2010/main" w="9525">
+                  <a14:hiddenLine xmlns:a14="http://schemas.microsoft.com/office/drawing/2010/main" xmlns="" w="9525">
                     <a:solidFill>
                       <a:srgbClr val="000000"/>
                     </a:solidFill>
@@ -10732,7 +10732,7 @@
               </a:ln>
               <a:extLst>
                 <a:ext uri="{91240B29-F687-4f45-9708-019B960494DF}">
-                  <a14:hiddenLine xmlns="" xmlns:a14="http://schemas.microsoft.com/office/drawing/2010/main" w="9525">
+                  <a14:hiddenLine xmlns:a14="http://schemas.microsoft.com/office/drawing/2010/main" xmlns="" w="9525">
                     <a:solidFill>
                       <a:srgbClr val="000000"/>
                     </a:solidFill>
@@ -10822,7 +10822,7 @@
               </a:ln>
               <a:extLst>
                 <a:ext uri="{91240B29-F687-4f45-9708-019B960494DF}">
-                  <a14:hiddenLine xmlns="" xmlns:a14="http://schemas.microsoft.com/office/drawing/2010/main" w="9525">
+                  <a14:hiddenLine xmlns:a14="http://schemas.microsoft.com/office/drawing/2010/main" xmlns="" w="9525">
                     <a:solidFill>
                       <a:srgbClr val="000000"/>
                     </a:solidFill>
@@ -10887,7 +10887,7 @@
               </a:ln>
               <a:extLst>
                 <a:ext uri="{91240B29-F687-4f45-9708-019B960494DF}">
-                  <a14:hiddenLine xmlns="" xmlns:a14="http://schemas.microsoft.com/office/drawing/2010/main" w="9525">
+                  <a14:hiddenLine xmlns:a14="http://schemas.microsoft.com/office/drawing/2010/main" xmlns="" w="9525">
                     <a:solidFill>
                       <a:srgbClr val="000000"/>
                     </a:solidFill>
@@ -11007,7 +11007,7 @@
               </a:ln>
               <a:extLst>
                 <a:ext uri="{91240B29-F687-4f45-9708-019B960494DF}">
-                  <a14:hiddenLine xmlns="" xmlns:a14="http://schemas.microsoft.com/office/drawing/2010/main" w="9525">
+                  <a14:hiddenLine xmlns:a14="http://schemas.microsoft.com/office/drawing/2010/main" xmlns="" w="9525">
                     <a:solidFill>
                       <a:srgbClr val="000000"/>
                     </a:solidFill>
@@ -11105,7 +11105,7 @@
               </a:ln>
               <a:extLst>
                 <a:ext uri="{91240B29-F687-4f45-9708-019B960494DF}">
-                  <a14:hiddenLine xmlns="" xmlns:a14="http://schemas.microsoft.com/office/drawing/2010/main" w="9525">
+                  <a14:hiddenLine xmlns:a14="http://schemas.microsoft.com/office/drawing/2010/main" xmlns="" w="9525">
                     <a:solidFill>
                       <a:srgbClr val="000000"/>
                     </a:solidFill>
@@ -11220,7 +11220,7 @@
               </a:ln>
               <a:extLst>
                 <a:ext uri="{91240B29-F687-4f45-9708-019B960494DF}">
-                  <a14:hiddenLine xmlns="" xmlns:a14="http://schemas.microsoft.com/office/drawing/2010/main" w="9525">
+                  <a14:hiddenLine xmlns:a14="http://schemas.microsoft.com/office/drawing/2010/main" xmlns="" w="9525">
                     <a:solidFill>
                       <a:srgbClr val="000000"/>
                     </a:solidFill>
@@ -11310,7 +11310,7 @@
               </a:ln>
               <a:extLst>
                 <a:ext uri="{91240B29-F687-4f45-9708-019B960494DF}">
-                  <a14:hiddenLine xmlns="" xmlns:a14="http://schemas.microsoft.com/office/drawing/2010/main" w="9525">
+                  <a14:hiddenLine xmlns:a14="http://schemas.microsoft.com/office/drawing/2010/main" xmlns="" w="9525">
                     <a:solidFill>
                       <a:srgbClr val="000000"/>
                     </a:solidFill>
@@ -11375,7 +11375,7 @@
               </a:ln>
               <a:extLst>
                 <a:ext uri="{91240B29-F687-4f45-9708-019B960494DF}">
-                  <a14:hiddenLine xmlns="" xmlns:a14="http://schemas.microsoft.com/office/drawing/2010/main" w="9525">
+                  <a14:hiddenLine xmlns:a14="http://schemas.microsoft.com/office/drawing/2010/main" xmlns="" w="9525">
                     <a:solidFill>
                       <a:srgbClr val="000000"/>
                     </a:solidFill>
@@ -11465,7 +11465,7 @@
               </a:ln>
               <a:extLst>
                 <a:ext uri="{91240B29-F687-4f45-9708-019B960494DF}">
-                  <a14:hiddenLine xmlns="" xmlns:a14="http://schemas.microsoft.com/office/drawing/2010/main" w="9525">
+                  <a14:hiddenLine xmlns:a14="http://schemas.microsoft.com/office/drawing/2010/main" xmlns="" w="9525">
                     <a:solidFill>
                       <a:srgbClr val="000000"/>
                     </a:solidFill>
@@ -11533,7 +11533,7 @@
               </a:ln>
               <a:extLst>
                 <a:ext uri="{91240B29-F687-4f45-9708-019B960494DF}">
-                  <a14:hiddenLine xmlns="" xmlns:a14="http://schemas.microsoft.com/office/drawing/2010/main" w="9525">
+                  <a14:hiddenLine xmlns:a14="http://schemas.microsoft.com/office/drawing/2010/main" xmlns="" w="9525">
                     <a:solidFill>
                       <a:srgbClr val="000000"/>
                     </a:solidFill>
@@ -11623,7 +11623,7 @@
               </a:ln>
               <a:extLst>
                 <a:ext uri="{91240B29-F687-4f45-9708-019B960494DF}">
-                  <a14:hiddenLine xmlns="" xmlns:a14="http://schemas.microsoft.com/office/drawing/2010/main" w="9525">
+                  <a14:hiddenLine xmlns:a14="http://schemas.microsoft.com/office/drawing/2010/main" xmlns="" w="9525">
                     <a:solidFill>
                       <a:srgbClr val="000000"/>
                     </a:solidFill>
@@ -11691,7 +11691,7 @@
               </a:ln>
               <a:extLst>
                 <a:ext uri="{91240B29-F687-4f45-9708-019B960494DF}">
-                  <a14:hiddenLine xmlns="" xmlns:a14="http://schemas.microsoft.com/office/drawing/2010/main" w="9525">
+                  <a14:hiddenLine xmlns:a14="http://schemas.microsoft.com/office/drawing/2010/main" xmlns="" w="9525">
                     <a:solidFill>
                       <a:srgbClr val="000000"/>
                     </a:solidFill>
@@ -11781,7 +11781,7 @@
               </a:ln>
               <a:extLst>
                 <a:ext uri="{91240B29-F687-4f45-9708-019B960494DF}">
-                  <a14:hiddenLine xmlns="" xmlns:a14="http://schemas.microsoft.com/office/drawing/2010/main" w="9525">
+                  <a14:hiddenLine xmlns:a14="http://schemas.microsoft.com/office/drawing/2010/main" xmlns="" w="9525">
                     <a:solidFill>
                       <a:srgbClr val="000000"/>
                     </a:solidFill>
@@ -11815,7 +11815,7 @@
               </a:ln>
               <a:extLst>
                 <a:ext uri="{91240B29-F687-4f45-9708-019B960494DF}">
-                  <a14:hiddenLine xmlns="" xmlns:a14="http://schemas.microsoft.com/office/drawing/2010/main" w="9525">
+                  <a14:hiddenLine xmlns:a14="http://schemas.microsoft.com/office/drawing/2010/main" xmlns="" w="9525">
                     <a:solidFill>
                       <a:srgbClr val="000000"/>
                     </a:solidFill>
@@ -12742,6 +12742,51 @@
           </a:prstGeom>
         </p:spPr>
       </p:pic>
+      <p:pic>
+        <p:nvPicPr>
+          <p:cNvPr id="2050" name="Picture 2" descr="https://lh3.googleusercontent.com/8Q4dHygJTeZKNgooY2ecxLgjxGvm7xvlsVAVNnkmqykW3u6Qk4PiBnhCz8tMRF2C4XfdUcEiHT36t26vyYCKsk1O9O33Jlsj2uAoLp3LJGxIpRWSpZNJBWdFEUFNEU8CS1Za4BTvd_HVLyY_uWITeuKHvNB_KOprujZOFgM6Nops8MlbUzWxy8-8yiFWmyzgRrlgJSqrabQxN6pFHaXVD9cBDIlw_96ButyFmEMTF0rluLRcFuZ_mpNeqLX3PBFac6NsLHpDM3rWxPORm46HPeaF6kGXeJ-KKM5belqhVsXQrR28vLM4CLo_wp7AouITjlg9WEsYV6uvqbESfN5jvoBpv9EH6XNdvF49oVKS1pgDPi1vU-UX9Pqe-cxAvplko776NxyrxWA6XqefFWqHa8aoQjKQj21jfpnh2fqPiGgU59H-d0Rp8oRcuyr8JBleAFcbY5qzPrPqud4OIMVaWLp6dFiHL3yC-vgnsYs3RZZe14BdpnVzHhxEoq9Ezq315h71oOqfbN7g1hr2o1b-nR3dWNd94BQlcZHbRVNL2kktTuhdrK0_vjDmgVzEL-8-7CNFbqGiHoQ_tsKyLuFSv7GnINm9or9M4jCUC69h4fSs6eLCxDf89SzSXCcoQOA4jnprGVIijTKpOmNZeEz7tA9Tk7Baghg=w687-h915-no">
+            <a:extLst>
+              <a:ext uri="{FF2B5EF4-FFF2-40B4-BE49-F238E27FC236}">
+                <a16:creationId xmlns:a16="http://schemas.microsoft.com/office/drawing/2014/main" id="{D79F52E4-BBB3-473D-AF72-8330E2B996E0}"/>
+              </a:ext>
+            </a:extLst>
+          </p:cNvPr>
+          <p:cNvPicPr>
+            <a:picLocks noChangeAspect="1" noChangeArrowheads="1"/>
+          </p:cNvPicPr>
+          <p:nvPr/>
+        </p:nvPicPr>
+        <p:blipFill rotWithShape="1">
+          <a:blip r:embed="rId3">
+            <a:extLst>
+              <a:ext uri="{28A0092B-C50C-407E-A947-70E740481C1C}">
+                <a14:useLocalDpi xmlns:a14="http://schemas.microsoft.com/office/drawing/2010/main" val="0"/>
+              </a:ext>
+            </a:extLst>
+          </a:blip>
+          <a:srcRect t="16290" b="9019"/>
+          <a:stretch/>
+        </p:blipFill>
+        <p:spPr bwMode="auto">
+          <a:xfrm>
+            <a:off x="6736080" y="2097088"/>
+            <a:ext cx="4053841" cy="4038415"/>
+          </a:xfrm>
+          <a:prstGeom prst="rect">
+            <a:avLst/>
+          </a:prstGeom>
+          <a:noFill/>
+          <a:extLst>
+            <a:ext uri="{909E8E84-426E-40DD-AFC4-6F175D3DCCD1}">
+              <a14:hiddenFill xmlns:a14="http://schemas.microsoft.com/office/drawing/2010/main">
+                <a:solidFill>
+                  <a:srgbClr val="FFFFFF"/>
+                </a:solidFill>
+              </a14:hiddenFill>
+            </a:ext>
+          </a:extLst>
+        </p:spPr>
+      </p:pic>
     </p:spTree>
     <p:extLst>
       <p:ext uri="{BB962C8B-B14F-4D97-AF65-F5344CB8AC3E}">
@@ -12810,12 +12855,57 @@
         </p:blipFill>
         <p:spPr>
           <a:xfrm>
-            <a:off x="1141413" y="2609947"/>
-            <a:ext cx="4395945" cy="2792478"/>
+            <a:off x="1141413" y="2260634"/>
+            <a:ext cx="5147627" cy="3269976"/>
           </a:xfrm>
           <a:prstGeom prst="rect">
             <a:avLst/>
           </a:prstGeom>
+        </p:spPr>
+      </p:pic>
+      <p:pic>
+        <p:nvPicPr>
+          <p:cNvPr id="1026" name="Picture 2" descr="https://lh3.googleusercontent.com/oE7Hmbb0FjIIEoRLR22e3IbL8krRq7CM_8kAvcdSJ_unb8RQhWLkgqJew1wtNi7uIr4oSSFSXHFsDPaTNjWhGoiyjsm3tRLioY1GoknXe0ZyyL_1zGzgqqZGEslduesdKvJZpUmHrFb04SUYEf3FFa3VWFutne_Av-7lu5RWbP_KPPVB9YrooVMi1i1CsuuKjrVonfnWNEwKIDfybuyVnyEd8zQRjNGIfSq4nFLg9IPaeViHC3C0MxrlxXbexI0bpA7PqNTRXOdKiEzpsq4s22NrS-Y3jyKO67mvlhbKxYRAgGTD6sQwnKGsJLW0B3dSdw7ypGKimMjLiJV18ywXN8xkDBhbIE4bTJ6Ud5Sc9aMcnqRfTig5aLm4hf9ogKLf7-6Z2wFc4rj6LGxVWf2NcdWLvC9c14tc2XM86W1-DqlU6ck_x8oRyUMXrxame11Mx99Ef_hilKF1t-xCnMu1-vd-14d1_BvXo7ugpHqmdDelvDguaskGCNF9xuXy2IUe6lqjzx0HzY_V0yV-_TWhj7QsXnfcOqIdxw0EZw9HfDff1TSoyAanzISsHfLQdb1oKBtQhLKxtZF9V74FkC9lk6BlTfBzsQwRHrcX9sUKiP190URqbY1BJP7DM97Um_qH5BOWdw-yC7O4EC5NgkTWPVyT0cnAFm4=w687-h915-no">
+            <a:extLst>
+              <a:ext uri="{FF2B5EF4-FFF2-40B4-BE49-F238E27FC236}">
+                <a16:creationId xmlns:a16="http://schemas.microsoft.com/office/drawing/2014/main" id="{90C54B4B-BF0A-4645-8838-2BCB3CE89FC4}"/>
+              </a:ext>
+            </a:extLst>
+          </p:cNvPr>
+          <p:cNvPicPr>
+            <a:picLocks noChangeAspect="1" noChangeArrowheads="1"/>
+          </p:cNvPicPr>
+          <p:nvPr/>
+        </p:nvPicPr>
+        <p:blipFill rotWithShape="1">
+          <a:blip r:embed="rId3">
+            <a:extLst>
+              <a:ext uri="{28A0092B-C50C-407E-A947-70E740481C1C}">
+                <a14:useLocalDpi xmlns:a14="http://schemas.microsoft.com/office/drawing/2010/main" val="0"/>
+              </a:ext>
+            </a:extLst>
+          </a:blip>
+          <a:srcRect b="15962"/>
+          <a:stretch/>
+        </p:blipFill>
+        <p:spPr bwMode="auto">
+          <a:xfrm>
+            <a:off x="7059552" y="2260634"/>
+            <a:ext cx="3114687" cy="3491103"/>
+          </a:xfrm>
+          <a:prstGeom prst="rect">
+            <a:avLst/>
+          </a:prstGeom>
+          <a:noFill/>
+          <a:extLst>
+            <a:ext uri="{909E8E84-426E-40DD-AFC4-6F175D3DCCD1}">
+              <a14:hiddenFill xmlns:a14="http://schemas.microsoft.com/office/drawing/2010/main">
+                <a:solidFill>
+                  <a:srgbClr val="FFFFFF"/>
+                </a:solidFill>
+              </a14:hiddenFill>
+            </a:ext>
+          </a:extLst>
         </p:spPr>
       </p:pic>
     </p:spTree>
@@ -12892,6 +12982,51 @@
           <a:prstGeom prst="rect">
             <a:avLst/>
           </a:prstGeom>
+        </p:spPr>
+      </p:pic>
+      <p:pic>
+        <p:nvPicPr>
+          <p:cNvPr id="3074" name="Picture 2" descr="https://lh3.googleusercontent.com/5Knk94CGxlWuQg4u0uWVWs5Jer01AvvlAfS5tW0K1GHXotmYL9DVT8yrlWjcZYGksk2A22bZx46h04iFHG5Wyf8gNYWH2Typ06t5JDVvr_cD83FlJuzhtc8ceNGAyVPw7OjsZVhG-VZLWx0XBfih9WrApit-_IqZjXy3pRq3UJ-VlIli1nKpI4osbuUWgq1tzWwz6En5yDgRsE7h_x-xQuEM90pUPDsIe6TbhZHyS0w7usdAZrl9kk8MnoUUbc8C5t2SKhzf79PMx0tgHcfkRZ1aLoYdQt92GOY75r0L4QmImAcmGr5GCoPBe76YrCpDK7dVnAEvUQjDZHs7YKDNBZ7tZdUbYKhuleDIyXQJbqybAUcTLHGwCPzTGwNg6ncOs0XOBSjRp4ZjklYJjf3fpIprayu674V-jJrI3BGRZJVQ3wp0e4H-E18QcdkMXfxsnIQs7N5l10X0MY9oS_a5Fb6w-YkygXJCT5PZ40UCXVV8V_h2DBGbIqxaLSGoidifFERpmEr_oseiaE-2nYbrvBOMS62a5AxCMuxoaaPiPinHLuYbRWdUdDMUO-p5O-H4YqA6PDXreNIV73RB3H6B8fg1ZrDOxihd7McOOG80SXTPplUOBDBE_54ze6QdCswCl00knAwmYmUAM1NfFaA89lcNUomiiaU=w687-h915-no">
+            <a:extLst>
+              <a:ext uri="{FF2B5EF4-FFF2-40B4-BE49-F238E27FC236}">
+                <a16:creationId xmlns:a16="http://schemas.microsoft.com/office/drawing/2014/main" id="{B0EA303F-950B-4286-8FE9-71FE4F7D0226}"/>
+              </a:ext>
+            </a:extLst>
+          </p:cNvPr>
+          <p:cNvPicPr>
+            <a:picLocks noChangeAspect="1" noChangeArrowheads="1"/>
+          </p:cNvPicPr>
+          <p:nvPr/>
+        </p:nvPicPr>
+        <p:blipFill rotWithShape="1">
+          <a:blip r:embed="rId3">
+            <a:extLst>
+              <a:ext uri="{28A0092B-C50C-407E-A947-70E740481C1C}">
+                <a14:useLocalDpi xmlns:a14="http://schemas.microsoft.com/office/drawing/2010/main" val="0"/>
+              </a:ext>
+            </a:extLst>
+          </a:blip>
+          <a:srcRect l="14449" t="30579" r="17196" b="21528"/>
+          <a:stretch/>
+        </p:blipFill>
+        <p:spPr bwMode="auto">
+          <a:xfrm>
+            <a:off x="6124128" y="2215592"/>
+            <a:ext cx="4019550" cy="3756300"/>
+          </a:xfrm>
+          <a:prstGeom prst="rect">
+            <a:avLst/>
+          </a:prstGeom>
+          <a:noFill/>
+          <a:extLst>
+            <a:ext uri="{909E8E84-426E-40DD-AFC4-6F175D3DCCD1}">
+              <a14:hiddenFill xmlns:a14="http://schemas.microsoft.com/office/drawing/2010/main">
+                <a:solidFill>
+                  <a:srgbClr val="FFFFFF"/>
+                </a:solidFill>
+              </a14:hiddenFill>
+            </a:ext>
+          </a:extLst>
         </p:spPr>
       </p:pic>
     </p:spTree>
@@ -13160,7 +13295,6 @@
               <a:rPr lang="en-US" dirty="0"/>
               <a:t>Upcoming manufactured Parts</a:t>
             </a:r>
-            <a:endParaRPr lang="en-US" dirty="0"/>
           </a:p>
         </p:txBody>
       </p:sp>

</xml_diff>

<commit_message>
Gannt chart updated in the ppt
</commit_message>
<xml_diff>
--- a/Battlebot 3 progress report.pptx
+++ b/Battlebot 3 progress report.pptx
@@ -179,7 +179,7 @@
           <a:noFill/>
           <a:extLst>
             <a:ext uri="{909E8E84-426E-40dd-AFC4-6F175D3DCCD1}">
-              <a14:hiddenFill xmlns:a14="http://schemas.microsoft.com/office/drawing/2010/main" xmlns="">
+              <a14:hiddenFill xmlns="" xmlns:a14="http://schemas.microsoft.com/office/drawing/2010/main">
                 <a:solidFill>
                   <a:srgbClr val="FFFFFF"/>
                 </a:solidFill>
@@ -239,7 +239,7 @@
             </a:ln>
             <a:extLst>
               <a:ext uri="{91240B29-F687-4f45-9708-019B960494DF}">
-                <a14:hiddenLine xmlns:a14="http://schemas.microsoft.com/office/drawing/2010/main" xmlns="" w="9525">
+                <a14:hiddenLine xmlns="" xmlns:a14="http://schemas.microsoft.com/office/drawing/2010/main" w="9525">
                   <a:solidFill>
                     <a:srgbClr val="000000"/>
                   </a:solidFill>
@@ -329,7 +329,7 @@
             </a:ln>
             <a:extLst>
               <a:ext uri="{91240B29-F687-4f45-9708-019B960494DF}">
-                <a14:hiddenLine xmlns:a14="http://schemas.microsoft.com/office/drawing/2010/main" xmlns="" w="9525">
+                <a14:hiddenLine xmlns="" xmlns:a14="http://schemas.microsoft.com/office/drawing/2010/main" w="9525">
                   <a:solidFill>
                     <a:srgbClr val="000000"/>
                   </a:solidFill>
@@ -419,7 +419,7 @@
             </a:ln>
             <a:extLst>
               <a:ext uri="{91240B29-F687-4f45-9708-019B960494DF}">
-                <a14:hiddenLine xmlns:a14="http://schemas.microsoft.com/office/drawing/2010/main" xmlns="" w="9525">
+                <a14:hiddenLine xmlns="" xmlns:a14="http://schemas.microsoft.com/office/drawing/2010/main" w="9525">
                   <a:solidFill>
                     <a:srgbClr val="000000"/>
                   </a:solidFill>
@@ -453,7 +453,7 @@
             </a:ln>
             <a:extLst>
               <a:ext uri="{91240B29-F687-4f45-9708-019B960494DF}">
-                <a14:hiddenLine xmlns:a14="http://schemas.microsoft.com/office/drawing/2010/main" xmlns="" w="9525">
+                <a14:hiddenLine xmlns="" xmlns:a14="http://schemas.microsoft.com/office/drawing/2010/main" w="9525">
                   <a:solidFill>
                     <a:srgbClr val="000000"/>
                   </a:solidFill>
@@ -543,7 +543,7 @@
             </a:ln>
             <a:extLst>
               <a:ext uri="{91240B29-F687-4f45-9708-019B960494DF}">
-                <a14:hiddenLine xmlns:a14="http://schemas.microsoft.com/office/drawing/2010/main" xmlns="" w="9525">
+                <a14:hiddenLine xmlns="" xmlns:a14="http://schemas.microsoft.com/office/drawing/2010/main" w="9525">
                   <a:solidFill>
                     <a:srgbClr val="000000"/>
                   </a:solidFill>
@@ -605,7 +605,7 @@
             </a:ln>
             <a:extLst>
               <a:ext uri="{91240B29-F687-4f45-9708-019B960494DF}">
-                <a14:hiddenLine xmlns:a14="http://schemas.microsoft.com/office/drawing/2010/main" xmlns="" w="9525">
+                <a14:hiddenLine xmlns="" xmlns:a14="http://schemas.microsoft.com/office/drawing/2010/main" w="9525">
                   <a:solidFill>
                     <a:srgbClr val="000000"/>
                   </a:solidFill>
@@ -667,7 +667,7 @@
             </a:ln>
             <a:extLst>
               <a:ext uri="{91240B29-F687-4f45-9708-019B960494DF}">
-                <a14:hiddenLine xmlns:a14="http://schemas.microsoft.com/office/drawing/2010/main" xmlns="" w="9525">
+                <a14:hiddenLine xmlns="" xmlns:a14="http://schemas.microsoft.com/office/drawing/2010/main" w="9525">
                   <a:solidFill>
                     <a:srgbClr val="000000"/>
                   </a:solidFill>
@@ -757,7 +757,7 @@
             </a:ln>
             <a:extLst>
               <a:ext uri="{91240B29-F687-4f45-9708-019B960494DF}">
-                <a14:hiddenLine xmlns:a14="http://schemas.microsoft.com/office/drawing/2010/main" xmlns="" w="9525">
+                <a14:hiddenLine xmlns="" xmlns:a14="http://schemas.microsoft.com/office/drawing/2010/main" w="9525">
                   <a:solidFill>
                     <a:srgbClr val="000000"/>
                   </a:solidFill>
@@ -819,7 +819,7 @@
             </a:ln>
             <a:extLst>
               <a:ext uri="{91240B29-F687-4f45-9708-019B960494DF}">
-                <a14:hiddenLine xmlns:a14="http://schemas.microsoft.com/office/drawing/2010/main" xmlns="" w="9525">
+                <a14:hiddenLine xmlns="" xmlns:a14="http://schemas.microsoft.com/office/drawing/2010/main" w="9525">
                   <a:solidFill>
                     <a:srgbClr val="000000"/>
                   </a:solidFill>
@@ -881,7 +881,7 @@
             </a:ln>
             <a:extLst>
               <a:ext uri="{91240B29-F687-4f45-9708-019B960494DF}">
-                <a14:hiddenLine xmlns:a14="http://schemas.microsoft.com/office/drawing/2010/main" xmlns="" w="9525">
+                <a14:hiddenLine xmlns="" xmlns:a14="http://schemas.microsoft.com/office/drawing/2010/main" w="9525">
                   <a:solidFill>
                     <a:srgbClr val="000000"/>
                   </a:solidFill>
@@ -971,7 +971,7 @@
             </a:ln>
             <a:extLst>
               <a:ext uri="{91240B29-F687-4f45-9708-019B960494DF}">
-                <a14:hiddenLine xmlns:a14="http://schemas.microsoft.com/office/drawing/2010/main" xmlns="" w="9525">
+                <a14:hiddenLine xmlns="" xmlns:a14="http://schemas.microsoft.com/office/drawing/2010/main" w="9525">
                   <a:solidFill>
                     <a:srgbClr val="000000"/>
                   </a:solidFill>
@@ -1061,7 +1061,7 @@
             </a:ln>
             <a:extLst>
               <a:ext uri="{91240B29-F687-4f45-9708-019B960494DF}">
-                <a14:hiddenLine xmlns:a14="http://schemas.microsoft.com/office/drawing/2010/main" xmlns="" w="9525">
+                <a14:hiddenLine xmlns="" xmlns:a14="http://schemas.microsoft.com/office/drawing/2010/main" w="9525">
                   <a:solidFill>
                     <a:srgbClr val="000000"/>
                   </a:solidFill>
@@ -1123,7 +1123,7 @@
             </a:ln>
             <a:extLst>
               <a:ext uri="{91240B29-F687-4f45-9708-019B960494DF}">
-                <a14:hiddenLine xmlns:a14="http://schemas.microsoft.com/office/drawing/2010/main" xmlns="" w="9525">
+                <a14:hiddenLine xmlns="" xmlns:a14="http://schemas.microsoft.com/office/drawing/2010/main" w="9525">
                   <a:solidFill>
                     <a:srgbClr val="000000"/>
                   </a:solidFill>
@@ -1233,7 +1233,7 @@
             </a:ln>
             <a:extLst>
               <a:ext uri="{91240B29-F687-4f45-9708-019B960494DF}">
-                <a14:hiddenLine xmlns:a14="http://schemas.microsoft.com/office/drawing/2010/main" xmlns="" w="9525">
+                <a14:hiddenLine xmlns="" xmlns:a14="http://schemas.microsoft.com/office/drawing/2010/main" w="9525">
                   <a:solidFill>
                     <a:srgbClr val="000000"/>
                   </a:solidFill>
@@ -1295,7 +1295,7 @@
             </a:ln>
             <a:extLst>
               <a:ext uri="{91240B29-F687-4f45-9708-019B960494DF}">
-                <a14:hiddenLine xmlns:a14="http://schemas.microsoft.com/office/drawing/2010/main" xmlns="" w="9525">
+                <a14:hiddenLine xmlns="" xmlns:a14="http://schemas.microsoft.com/office/drawing/2010/main" w="9525">
                   <a:solidFill>
                     <a:srgbClr val="000000"/>
                   </a:solidFill>
@@ -1385,7 +1385,7 @@
             </a:ln>
             <a:extLst>
               <a:ext uri="{91240B29-F687-4f45-9708-019B960494DF}">
-                <a14:hiddenLine xmlns:a14="http://schemas.microsoft.com/office/drawing/2010/main" xmlns="" w="9525">
+                <a14:hiddenLine xmlns="" xmlns:a14="http://schemas.microsoft.com/office/drawing/2010/main" w="9525">
                   <a:solidFill>
                     <a:srgbClr val="000000"/>
                   </a:solidFill>
@@ -1475,7 +1475,7 @@
             </a:ln>
             <a:extLst>
               <a:ext uri="{91240B29-F687-4f45-9708-019B960494DF}">
-                <a14:hiddenLine xmlns:a14="http://schemas.microsoft.com/office/drawing/2010/main" xmlns="" w="9525">
+                <a14:hiddenLine xmlns="" xmlns:a14="http://schemas.microsoft.com/office/drawing/2010/main" w="9525">
                   <a:solidFill>
                     <a:srgbClr val="000000"/>
                   </a:solidFill>
@@ -1537,7 +1537,7 @@
             </a:ln>
             <a:extLst>
               <a:ext uri="{91240B29-F687-4f45-9708-019B960494DF}">
-                <a14:hiddenLine xmlns:a14="http://schemas.microsoft.com/office/drawing/2010/main" xmlns="" w="9525">
+                <a14:hiddenLine xmlns="" xmlns:a14="http://schemas.microsoft.com/office/drawing/2010/main" w="9525">
                   <a:solidFill>
                     <a:srgbClr val="000000"/>
                   </a:solidFill>
@@ -1627,7 +1627,7 @@
             </a:ln>
             <a:extLst>
               <a:ext uri="{91240B29-F687-4f45-9708-019B960494DF}">
-                <a14:hiddenLine xmlns:a14="http://schemas.microsoft.com/office/drawing/2010/main" xmlns="" w="9525">
+                <a14:hiddenLine xmlns="" xmlns:a14="http://schemas.microsoft.com/office/drawing/2010/main" w="9525">
                   <a:solidFill>
                     <a:srgbClr val="000000"/>
                   </a:solidFill>
@@ -1717,7 +1717,7 @@
             </a:ln>
             <a:extLst>
               <a:ext uri="{91240B29-F687-4f45-9708-019B960494DF}">
-                <a14:hiddenLine xmlns:a14="http://schemas.microsoft.com/office/drawing/2010/main" xmlns="" w="9525">
+                <a14:hiddenLine xmlns="" xmlns:a14="http://schemas.microsoft.com/office/drawing/2010/main" w="9525">
                   <a:solidFill>
                     <a:srgbClr val="000000"/>
                   </a:solidFill>
@@ -1773,7 +1773,7 @@
             </a:ln>
             <a:extLst>
               <a:ext uri="{91240B29-F687-4f45-9708-019B960494DF}">
-                <a14:hiddenLine xmlns:a14="http://schemas.microsoft.com/office/drawing/2010/main" xmlns="" w="9525">
+                <a14:hiddenLine xmlns="" xmlns:a14="http://schemas.microsoft.com/office/drawing/2010/main" w="9525">
                   <a:solidFill>
                     <a:srgbClr val="000000"/>
                   </a:solidFill>
@@ -1863,7 +1863,7 @@
             </a:ln>
             <a:extLst>
               <a:ext uri="{91240B29-F687-4f45-9708-019B960494DF}">
-                <a14:hiddenLine xmlns:a14="http://schemas.microsoft.com/office/drawing/2010/main" xmlns="" w="9525">
+                <a14:hiddenLine xmlns="" xmlns:a14="http://schemas.microsoft.com/office/drawing/2010/main" w="9525">
                   <a:solidFill>
                     <a:srgbClr val="000000"/>
                   </a:solidFill>
@@ -1919,7 +1919,7 @@
             </a:ln>
             <a:extLst>
               <a:ext uri="{91240B29-F687-4f45-9708-019B960494DF}">
-                <a14:hiddenLine xmlns:a14="http://schemas.microsoft.com/office/drawing/2010/main" xmlns="" w="9525">
+                <a14:hiddenLine xmlns="" xmlns:a14="http://schemas.microsoft.com/office/drawing/2010/main" w="9525">
                   <a:solidFill>
                     <a:srgbClr val="000000"/>
                   </a:solidFill>
@@ -2009,7 +2009,7 @@
             </a:ln>
             <a:extLst>
               <a:ext uri="{91240B29-F687-4f45-9708-019B960494DF}">
-                <a14:hiddenLine xmlns:a14="http://schemas.microsoft.com/office/drawing/2010/main" xmlns="" w="9525">
+                <a14:hiddenLine xmlns="" xmlns:a14="http://schemas.microsoft.com/office/drawing/2010/main" w="9525">
                   <a:solidFill>
                     <a:srgbClr val="000000"/>
                   </a:solidFill>
@@ -2077,7 +2077,7 @@
             </a:ln>
             <a:extLst>
               <a:ext uri="{91240B29-F687-4f45-9708-019B960494DF}">
-                <a14:hiddenLine xmlns:a14="http://schemas.microsoft.com/office/drawing/2010/main" xmlns="" w="9525">
+                <a14:hiddenLine xmlns="" xmlns:a14="http://schemas.microsoft.com/office/drawing/2010/main" w="9525">
                   <a:solidFill>
                     <a:srgbClr val="000000"/>
                   </a:solidFill>
@@ -2167,7 +2167,7 @@
             </a:ln>
             <a:extLst>
               <a:ext uri="{91240B29-F687-4f45-9708-019B960494DF}">
-                <a14:hiddenLine xmlns:a14="http://schemas.microsoft.com/office/drawing/2010/main" xmlns="" w="9525">
+                <a14:hiddenLine xmlns="" xmlns:a14="http://schemas.microsoft.com/office/drawing/2010/main" w="9525">
                   <a:solidFill>
                     <a:srgbClr val="000000"/>
                   </a:solidFill>
@@ -2235,7 +2235,7 @@
             </a:ln>
             <a:extLst>
               <a:ext uri="{91240B29-F687-4f45-9708-019B960494DF}">
-                <a14:hiddenLine xmlns:a14="http://schemas.microsoft.com/office/drawing/2010/main" xmlns="" w="9525">
+                <a14:hiddenLine xmlns="" xmlns:a14="http://schemas.microsoft.com/office/drawing/2010/main" w="9525">
                   <a:solidFill>
                     <a:srgbClr val="000000"/>
                   </a:solidFill>
@@ -2325,7 +2325,7 @@
             </a:ln>
             <a:extLst>
               <a:ext uri="{91240B29-F687-4f45-9708-019B960494DF}">
-                <a14:hiddenLine xmlns:a14="http://schemas.microsoft.com/office/drawing/2010/main" xmlns="" w="9525">
+                <a14:hiddenLine xmlns="" xmlns:a14="http://schemas.microsoft.com/office/drawing/2010/main" w="9525">
                   <a:solidFill>
                     <a:srgbClr val="000000"/>
                   </a:solidFill>
@@ -2359,7 +2359,7 @@
             </a:ln>
             <a:extLst>
               <a:ext uri="{91240B29-F687-4f45-9708-019B960494DF}">
-                <a14:hiddenLine xmlns:a14="http://schemas.microsoft.com/office/drawing/2010/main" xmlns="" w="9525">
+                <a14:hiddenLine xmlns="" xmlns:a14="http://schemas.microsoft.com/office/drawing/2010/main" w="9525">
                   <a:solidFill>
                     <a:srgbClr val="000000"/>
                   </a:solidFill>
@@ -2449,7 +2449,7 @@
             </a:ln>
             <a:extLst>
               <a:ext uri="{91240B29-F687-4f45-9708-019B960494DF}">
-                <a14:hiddenLine xmlns:a14="http://schemas.microsoft.com/office/drawing/2010/main" xmlns="" w="9525">
+                <a14:hiddenLine xmlns="" xmlns:a14="http://schemas.microsoft.com/office/drawing/2010/main" w="9525">
                   <a:solidFill>
                     <a:srgbClr val="000000"/>
                   </a:solidFill>
@@ -2511,7 +2511,7 @@
             </a:ln>
             <a:extLst>
               <a:ext uri="{91240B29-F687-4f45-9708-019B960494DF}">
-                <a14:hiddenLine xmlns:a14="http://schemas.microsoft.com/office/drawing/2010/main" xmlns="" w="9525">
+                <a14:hiddenLine xmlns="" xmlns:a14="http://schemas.microsoft.com/office/drawing/2010/main" w="9525">
                   <a:solidFill>
                     <a:srgbClr val="000000"/>
                   </a:solidFill>
@@ -2573,7 +2573,7 @@
             </a:ln>
             <a:extLst>
               <a:ext uri="{91240B29-F687-4f45-9708-019B960494DF}">
-                <a14:hiddenLine xmlns:a14="http://schemas.microsoft.com/office/drawing/2010/main" xmlns="" w="9525">
+                <a14:hiddenLine xmlns="" xmlns:a14="http://schemas.microsoft.com/office/drawing/2010/main" w="9525">
                   <a:solidFill>
                     <a:srgbClr val="000000"/>
                   </a:solidFill>
@@ -2663,7 +2663,7 @@
             </a:ln>
             <a:extLst>
               <a:ext uri="{91240B29-F687-4f45-9708-019B960494DF}">
-                <a14:hiddenLine xmlns:a14="http://schemas.microsoft.com/office/drawing/2010/main" xmlns="" w="9525">
+                <a14:hiddenLine xmlns="" xmlns:a14="http://schemas.microsoft.com/office/drawing/2010/main" w="9525">
                   <a:solidFill>
                     <a:srgbClr val="000000"/>
                   </a:solidFill>
@@ -2731,7 +2731,7 @@
             </a:ln>
             <a:extLst>
               <a:ext uri="{91240B29-F687-4f45-9708-019B960494DF}">
-                <a14:hiddenLine xmlns:a14="http://schemas.microsoft.com/office/drawing/2010/main" xmlns="" w="9525">
+                <a14:hiddenLine xmlns="" xmlns:a14="http://schemas.microsoft.com/office/drawing/2010/main" w="9525">
                   <a:solidFill>
                     <a:srgbClr val="000000"/>
                   </a:solidFill>
@@ -2793,7 +2793,7 @@
             </a:ln>
             <a:extLst>
               <a:ext uri="{91240B29-F687-4f45-9708-019B960494DF}">
-                <a14:hiddenLine xmlns:a14="http://schemas.microsoft.com/office/drawing/2010/main" xmlns="" w="9525">
+                <a14:hiddenLine xmlns="" xmlns:a14="http://schemas.microsoft.com/office/drawing/2010/main" w="9525">
                   <a:solidFill>
                     <a:srgbClr val="000000"/>
                   </a:solidFill>
@@ -2883,7 +2883,7 @@
             </a:ln>
             <a:extLst>
               <a:ext uri="{91240B29-F687-4f45-9708-019B960494DF}">
-                <a14:hiddenLine xmlns:a14="http://schemas.microsoft.com/office/drawing/2010/main" xmlns="" w="9525">
+                <a14:hiddenLine xmlns="" xmlns:a14="http://schemas.microsoft.com/office/drawing/2010/main" w="9525">
                   <a:solidFill>
                     <a:srgbClr val="000000"/>
                   </a:solidFill>
@@ -2945,7 +2945,7 @@
             </a:ln>
             <a:extLst>
               <a:ext uri="{91240B29-F687-4f45-9708-019B960494DF}">
-                <a14:hiddenLine xmlns:a14="http://schemas.microsoft.com/office/drawing/2010/main" xmlns="" w="9525">
+                <a14:hiddenLine xmlns="" xmlns:a14="http://schemas.microsoft.com/office/drawing/2010/main" w="9525">
                   <a:solidFill>
                     <a:srgbClr val="000000"/>
                   </a:solidFill>
@@ -3035,7 +3035,7 @@
             </a:ln>
             <a:extLst>
               <a:ext uri="{91240B29-F687-4f45-9708-019B960494DF}">
-                <a14:hiddenLine xmlns:a14="http://schemas.microsoft.com/office/drawing/2010/main" xmlns="" w="9525">
+                <a14:hiddenLine xmlns="" xmlns:a14="http://schemas.microsoft.com/office/drawing/2010/main" w="9525">
                   <a:solidFill>
                     <a:srgbClr val="000000"/>
                   </a:solidFill>
@@ -3097,7 +3097,7 @@
             </a:ln>
             <a:extLst>
               <a:ext uri="{91240B29-F687-4f45-9708-019B960494DF}">
-                <a14:hiddenLine xmlns:a14="http://schemas.microsoft.com/office/drawing/2010/main" xmlns="" w="9525">
+                <a14:hiddenLine xmlns="" xmlns:a14="http://schemas.microsoft.com/office/drawing/2010/main" w="9525">
                   <a:solidFill>
                     <a:srgbClr val="000000"/>
                   </a:solidFill>
@@ -3187,7 +3187,7 @@
             </a:ln>
             <a:extLst>
               <a:ext uri="{91240B29-F687-4f45-9708-019B960494DF}">
-                <a14:hiddenLine xmlns:a14="http://schemas.microsoft.com/office/drawing/2010/main" xmlns="" w="9525">
+                <a14:hiddenLine xmlns="" xmlns:a14="http://schemas.microsoft.com/office/drawing/2010/main" w="9525">
                   <a:solidFill>
                     <a:srgbClr val="000000"/>
                   </a:solidFill>
@@ -3221,7 +3221,7 @@
             </a:ln>
             <a:extLst>
               <a:ext uri="{91240B29-F687-4f45-9708-019B960494DF}">
-                <a14:hiddenLine xmlns:a14="http://schemas.microsoft.com/office/drawing/2010/main" xmlns="" w="9525">
+                <a14:hiddenLine xmlns="" xmlns:a14="http://schemas.microsoft.com/office/drawing/2010/main" w="9525">
                   <a:solidFill>
                     <a:srgbClr val="000000"/>
                   </a:solidFill>
@@ -3286,7 +3286,7 @@
             </a:ln>
             <a:extLst>
               <a:ext uri="{91240B29-F687-4f45-9708-019B960494DF}">
-                <a14:hiddenLine xmlns:a14="http://schemas.microsoft.com/office/drawing/2010/main" xmlns="" w="9525">
+                <a14:hiddenLine xmlns="" xmlns:a14="http://schemas.microsoft.com/office/drawing/2010/main" w="9525">
                   <a:solidFill>
                     <a:srgbClr val="000000"/>
                   </a:solidFill>
@@ -3376,7 +3376,7 @@
             </a:ln>
             <a:extLst>
               <a:ext uri="{91240B29-F687-4f45-9708-019B960494DF}">
-                <a14:hiddenLine xmlns:a14="http://schemas.microsoft.com/office/drawing/2010/main" xmlns="" w="9525">
+                <a14:hiddenLine xmlns="" xmlns:a14="http://schemas.microsoft.com/office/drawing/2010/main" w="9525">
                   <a:solidFill>
                     <a:srgbClr val="000000"/>
                   </a:solidFill>
@@ -3438,7 +3438,7 @@
             </a:ln>
             <a:extLst>
               <a:ext uri="{91240B29-F687-4f45-9708-019B960494DF}">
-                <a14:hiddenLine xmlns:a14="http://schemas.microsoft.com/office/drawing/2010/main" xmlns="" w="9525">
+                <a14:hiddenLine xmlns="" xmlns:a14="http://schemas.microsoft.com/office/drawing/2010/main" w="9525">
                   <a:solidFill>
                     <a:srgbClr val="000000"/>
                   </a:solidFill>
@@ -3528,7 +3528,7 @@
             </a:ln>
             <a:extLst>
               <a:ext uri="{91240B29-F687-4f45-9708-019B960494DF}">
-                <a14:hiddenLine xmlns:a14="http://schemas.microsoft.com/office/drawing/2010/main" xmlns="" w="9525">
+                <a14:hiddenLine xmlns="" xmlns:a14="http://schemas.microsoft.com/office/drawing/2010/main" w="9525">
                   <a:solidFill>
                     <a:srgbClr val="000000"/>
                   </a:solidFill>
@@ -3618,7 +3618,7 @@
             </a:ln>
             <a:extLst>
               <a:ext uri="{91240B29-F687-4f45-9708-019B960494DF}">
-                <a14:hiddenLine xmlns:a14="http://schemas.microsoft.com/office/drawing/2010/main" xmlns="" w="9525">
+                <a14:hiddenLine xmlns="" xmlns:a14="http://schemas.microsoft.com/office/drawing/2010/main" w="9525">
                   <a:solidFill>
                     <a:srgbClr val="000000"/>
                   </a:solidFill>
@@ -3683,7 +3683,7 @@
             </a:ln>
             <a:extLst>
               <a:ext uri="{91240B29-F687-4f45-9708-019B960494DF}">
-                <a14:hiddenLine xmlns:a14="http://schemas.microsoft.com/office/drawing/2010/main" xmlns="" w="9525">
+                <a14:hiddenLine xmlns="" xmlns:a14="http://schemas.microsoft.com/office/drawing/2010/main" w="9525">
                   <a:solidFill>
                     <a:srgbClr val="000000"/>
                   </a:solidFill>
@@ -3745,7 +3745,7 @@
             </a:ln>
             <a:extLst>
               <a:ext uri="{91240B29-F687-4f45-9708-019B960494DF}">
-                <a14:hiddenLine xmlns:a14="http://schemas.microsoft.com/office/drawing/2010/main" xmlns="" w="9525">
+                <a14:hiddenLine xmlns="" xmlns:a14="http://schemas.microsoft.com/office/drawing/2010/main" w="9525">
                   <a:solidFill>
                     <a:srgbClr val="000000"/>
                   </a:solidFill>
@@ -3835,7 +3835,7 @@
             </a:ln>
             <a:extLst>
               <a:ext uri="{91240B29-F687-4f45-9708-019B960494DF}">
-                <a14:hiddenLine xmlns:a14="http://schemas.microsoft.com/office/drawing/2010/main" xmlns="" w="9525">
+                <a14:hiddenLine xmlns="" xmlns:a14="http://schemas.microsoft.com/office/drawing/2010/main" w="9525">
                   <a:solidFill>
                     <a:srgbClr val="000000"/>
                   </a:solidFill>
@@ -3925,7 +3925,7 @@
             </a:ln>
             <a:extLst>
               <a:ext uri="{91240B29-F687-4f45-9708-019B960494DF}">
-                <a14:hiddenLine xmlns:a14="http://schemas.microsoft.com/office/drawing/2010/main" xmlns="" w="9525">
+                <a14:hiddenLine xmlns="" xmlns:a14="http://schemas.microsoft.com/office/drawing/2010/main" w="9525">
                   <a:solidFill>
                     <a:srgbClr val="000000"/>
                   </a:solidFill>
@@ -3987,7 +3987,7 @@
             </a:ln>
             <a:extLst>
               <a:ext uri="{91240B29-F687-4f45-9708-019B960494DF}">
-                <a14:hiddenLine xmlns:a14="http://schemas.microsoft.com/office/drawing/2010/main" xmlns="" w="9525">
+                <a14:hiddenLine xmlns="" xmlns:a14="http://schemas.microsoft.com/office/drawing/2010/main" w="9525">
                   <a:solidFill>
                     <a:srgbClr val="000000"/>
                   </a:solidFill>
@@ -4107,7 +4107,7 @@
             </a:ln>
             <a:extLst>
               <a:ext uri="{91240B29-F687-4f45-9708-019B960494DF}">
-                <a14:hiddenLine xmlns:a14="http://schemas.microsoft.com/office/drawing/2010/main" xmlns="" w="9525">
+                <a14:hiddenLine xmlns="" xmlns:a14="http://schemas.microsoft.com/office/drawing/2010/main" w="9525">
                   <a:solidFill>
                     <a:srgbClr val="000000"/>
                   </a:solidFill>
@@ -4175,7 +4175,7 @@
             </a:ln>
             <a:extLst>
               <a:ext uri="{91240B29-F687-4f45-9708-019B960494DF}">
-                <a14:hiddenLine xmlns:a14="http://schemas.microsoft.com/office/drawing/2010/main" xmlns="" w="9525">
+                <a14:hiddenLine xmlns="" xmlns:a14="http://schemas.microsoft.com/office/drawing/2010/main" w="9525">
                   <a:solidFill>
                     <a:srgbClr val="000000"/>
                   </a:solidFill>
@@ -4265,7 +4265,7 @@
             </a:ln>
             <a:extLst>
               <a:ext uri="{91240B29-F687-4f45-9708-019B960494DF}">
-                <a14:hiddenLine xmlns:a14="http://schemas.microsoft.com/office/drawing/2010/main" xmlns="" w="9525">
+                <a14:hiddenLine xmlns="" xmlns:a14="http://schemas.microsoft.com/office/drawing/2010/main" w="9525">
                   <a:solidFill>
                     <a:srgbClr val="000000"/>
                   </a:solidFill>
@@ -8994,7 +8994,7 @@
           <a:noFill/>
           <a:extLst>
             <a:ext uri="{909E8E84-426E-40dd-AFC4-6F175D3DCCD1}">
-              <a14:hiddenFill xmlns:a14="http://schemas.microsoft.com/office/drawing/2010/main" xmlns="">
+              <a14:hiddenFill xmlns="" xmlns:a14="http://schemas.microsoft.com/office/drawing/2010/main">
                 <a:solidFill>
                   <a:srgbClr val="FFFFFF"/>
                 </a:solidFill>
@@ -9068,7 +9068,7 @@
               </a:ln>
               <a:extLst>
                 <a:ext uri="{91240B29-F687-4f45-9708-019B960494DF}">
-                  <a14:hiddenLine xmlns:a14="http://schemas.microsoft.com/office/drawing/2010/main" xmlns="" w="9525">
+                  <a14:hiddenLine xmlns="" xmlns:a14="http://schemas.microsoft.com/office/drawing/2010/main" w="9525">
                     <a:solidFill>
                       <a:srgbClr val="000000"/>
                     </a:solidFill>
@@ -9158,7 +9158,7 @@
               </a:ln>
               <a:extLst>
                 <a:ext uri="{91240B29-F687-4f45-9708-019B960494DF}">
-                  <a14:hiddenLine xmlns:a14="http://schemas.microsoft.com/office/drawing/2010/main" xmlns="" w="9525">
+                  <a14:hiddenLine xmlns="" xmlns:a14="http://schemas.microsoft.com/office/drawing/2010/main" w="9525">
                     <a:solidFill>
                       <a:srgbClr val="000000"/>
                     </a:solidFill>
@@ -9248,7 +9248,7 @@
               </a:ln>
               <a:extLst>
                 <a:ext uri="{91240B29-F687-4f45-9708-019B960494DF}">
-                  <a14:hiddenLine xmlns:a14="http://schemas.microsoft.com/office/drawing/2010/main" xmlns="" w="9525">
+                  <a14:hiddenLine xmlns="" xmlns:a14="http://schemas.microsoft.com/office/drawing/2010/main" w="9525">
                     <a:solidFill>
                       <a:srgbClr val="000000"/>
                     </a:solidFill>
@@ -9310,7 +9310,7 @@
               </a:ln>
               <a:extLst>
                 <a:ext uri="{91240B29-F687-4f45-9708-019B960494DF}">
-                  <a14:hiddenLine xmlns:a14="http://schemas.microsoft.com/office/drawing/2010/main" xmlns="" w="9525">
+                  <a14:hiddenLine xmlns="" xmlns:a14="http://schemas.microsoft.com/office/drawing/2010/main" w="9525">
                     <a:solidFill>
                       <a:srgbClr val="000000"/>
                     </a:solidFill>
@@ -9400,7 +9400,7 @@
               </a:ln>
               <a:extLst>
                 <a:ext uri="{91240B29-F687-4f45-9708-019B960494DF}">
-                  <a14:hiddenLine xmlns:a14="http://schemas.microsoft.com/office/drawing/2010/main" xmlns="" w="9525">
+                  <a14:hiddenLine xmlns="" xmlns:a14="http://schemas.microsoft.com/office/drawing/2010/main" w="9525">
                     <a:solidFill>
                       <a:srgbClr val="000000"/>
                     </a:solidFill>
@@ -9462,7 +9462,7 @@
               </a:ln>
               <a:extLst>
                 <a:ext uri="{91240B29-F687-4f45-9708-019B960494DF}">
-                  <a14:hiddenLine xmlns:a14="http://schemas.microsoft.com/office/drawing/2010/main" xmlns="" w="9525">
+                  <a14:hiddenLine xmlns="" xmlns:a14="http://schemas.microsoft.com/office/drawing/2010/main" w="9525">
                     <a:solidFill>
                       <a:srgbClr val="000000"/>
                     </a:solidFill>
@@ -9524,7 +9524,7 @@
               </a:ln>
               <a:extLst>
                 <a:ext uri="{91240B29-F687-4f45-9708-019B960494DF}">
-                  <a14:hiddenLine xmlns:a14="http://schemas.microsoft.com/office/drawing/2010/main" xmlns="" w="9525">
+                  <a14:hiddenLine xmlns="" xmlns:a14="http://schemas.microsoft.com/office/drawing/2010/main" w="9525">
                     <a:solidFill>
                       <a:srgbClr val="000000"/>
                     </a:solidFill>
@@ -9614,7 +9614,7 @@
               </a:ln>
               <a:extLst>
                 <a:ext uri="{91240B29-F687-4f45-9708-019B960494DF}">
-                  <a14:hiddenLine xmlns:a14="http://schemas.microsoft.com/office/drawing/2010/main" xmlns="" w="9525">
+                  <a14:hiddenLine xmlns="" xmlns:a14="http://schemas.microsoft.com/office/drawing/2010/main" w="9525">
                     <a:solidFill>
                       <a:srgbClr val="000000"/>
                     </a:solidFill>
@@ -9704,7 +9704,7 @@
               </a:ln>
               <a:extLst>
                 <a:ext uri="{91240B29-F687-4f45-9708-019B960494DF}">
-                  <a14:hiddenLine xmlns:a14="http://schemas.microsoft.com/office/drawing/2010/main" xmlns="" w="9525">
+                  <a14:hiddenLine xmlns="" xmlns:a14="http://schemas.microsoft.com/office/drawing/2010/main" w="9525">
                     <a:solidFill>
                       <a:srgbClr val="000000"/>
                     </a:solidFill>
@@ -9766,7 +9766,7 @@
               </a:ln>
               <a:extLst>
                 <a:ext uri="{91240B29-F687-4f45-9708-019B960494DF}">
-                  <a14:hiddenLine xmlns:a14="http://schemas.microsoft.com/office/drawing/2010/main" xmlns="" w="9525">
+                  <a14:hiddenLine xmlns="" xmlns:a14="http://schemas.microsoft.com/office/drawing/2010/main" w="9525">
                     <a:solidFill>
                       <a:srgbClr val="000000"/>
                     </a:solidFill>
@@ -9876,7 +9876,7 @@
               </a:ln>
               <a:extLst>
                 <a:ext uri="{91240B29-F687-4f45-9708-019B960494DF}">
-                  <a14:hiddenLine xmlns:a14="http://schemas.microsoft.com/office/drawing/2010/main" xmlns="" w="9525">
+                  <a14:hiddenLine xmlns="" xmlns:a14="http://schemas.microsoft.com/office/drawing/2010/main" w="9525">
                     <a:solidFill>
                       <a:srgbClr val="000000"/>
                     </a:solidFill>
@@ -9960,7 +9960,7 @@
               </a:ln>
               <a:extLst>
                 <a:ext uri="{91240B29-F687-4f45-9708-019B960494DF}">
-                  <a14:hiddenLine xmlns:a14="http://schemas.microsoft.com/office/drawing/2010/main" xmlns="" w="9525">
+                  <a14:hiddenLine xmlns="" xmlns:a14="http://schemas.microsoft.com/office/drawing/2010/main" w="9525">
                     <a:solidFill>
                       <a:srgbClr val="000000"/>
                     </a:solidFill>
@@ -10022,7 +10022,7 @@
               </a:ln>
               <a:extLst>
                 <a:ext uri="{91240B29-F687-4f45-9708-019B960494DF}">
-                  <a14:hiddenLine xmlns:a14="http://schemas.microsoft.com/office/drawing/2010/main" xmlns="" w="9525">
+                  <a14:hiddenLine xmlns="" xmlns:a14="http://schemas.microsoft.com/office/drawing/2010/main" w="9525">
                     <a:solidFill>
                       <a:srgbClr val="000000"/>
                     </a:solidFill>
@@ -10084,7 +10084,7 @@
               </a:ln>
               <a:extLst>
                 <a:ext uri="{91240B29-F687-4f45-9708-019B960494DF}">
-                  <a14:hiddenLine xmlns:a14="http://schemas.microsoft.com/office/drawing/2010/main" xmlns="" w="9525">
+                  <a14:hiddenLine xmlns="" xmlns:a14="http://schemas.microsoft.com/office/drawing/2010/main" w="9525">
                     <a:solidFill>
                       <a:srgbClr val="000000"/>
                     </a:solidFill>
@@ -10174,7 +10174,7 @@
               </a:ln>
               <a:extLst>
                 <a:ext uri="{91240B29-F687-4f45-9708-019B960494DF}">
-                  <a14:hiddenLine xmlns:a14="http://schemas.microsoft.com/office/drawing/2010/main" xmlns="" w="9525">
+                  <a14:hiddenLine xmlns="" xmlns:a14="http://schemas.microsoft.com/office/drawing/2010/main" w="9525">
                     <a:solidFill>
                       <a:srgbClr val="000000"/>
                     </a:solidFill>
@@ -10208,7 +10208,7 @@
               </a:ln>
               <a:extLst>
                 <a:ext uri="{91240B29-F687-4f45-9708-019B960494DF}">
-                  <a14:hiddenLine xmlns:a14="http://schemas.microsoft.com/office/drawing/2010/main" xmlns="" w="9525">
+                  <a14:hiddenLine xmlns="" xmlns:a14="http://schemas.microsoft.com/office/drawing/2010/main" w="9525">
                     <a:solidFill>
                       <a:srgbClr val="000000"/>
                     </a:solidFill>
@@ -10273,7 +10273,7 @@
               </a:ln>
               <a:extLst>
                 <a:ext uri="{91240B29-F687-4f45-9708-019B960494DF}">
-                  <a14:hiddenLine xmlns:a14="http://schemas.microsoft.com/office/drawing/2010/main" xmlns="" w="9525">
+                  <a14:hiddenLine xmlns="" xmlns:a14="http://schemas.microsoft.com/office/drawing/2010/main" w="9525">
                     <a:solidFill>
                       <a:srgbClr val="000000"/>
                     </a:solidFill>
@@ -10363,7 +10363,7 @@
               </a:ln>
               <a:extLst>
                 <a:ext uri="{91240B29-F687-4f45-9708-019B960494DF}">
-                  <a14:hiddenLine xmlns:a14="http://schemas.microsoft.com/office/drawing/2010/main" xmlns="" w="9525">
+                  <a14:hiddenLine xmlns="" xmlns:a14="http://schemas.microsoft.com/office/drawing/2010/main" w="9525">
                     <a:solidFill>
                       <a:srgbClr val="000000"/>
                     </a:solidFill>
@@ -10425,7 +10425,7 @@
               </a:ln>
               <a:extLst>
                 <a:ext uri="{91240B29-F687-4f45-9708-019B960494DF}">
-                  <a14:hiddenLine xmlns:a14="http://schemas.microsoft.com/office/drawing/2010/main" xmlns="" w="9525">
+                  <a14:hiddenLine xmlns="" xmlns:a14="http://schemas.microsoft.com/office/drawing/2010/main" w="9525">
                     <a:solidFill>
                       <a:srgbClr val="000000"/>
                     </a:solidFill>
@@ -10515,7 +10515,7 @@
               </a:ln>
               <a:extLst>
                 <a:ext uri="{91240B29-F687-4f45-9708-019B960494DF}">
-                  <a14:hiddenLine xmlns:a14="http://schemas.microsoft.com/office/drawing/2010/main" xmlns="" w="9525">
+                  <a14:hiddenLine xmlns="" xmlns:a14="http://schemas.microsoft.com/office/drawing/2010/main" w="9525">
                     <a:solidFill>
                       <a:srgbClr val="000000"/>
                     </a:solidFill>
@@ -10580,7 +10580,7 @@
               </a:ln>
               <a:extLst>
                 <a:ext uri="{91240B29-F687-4f45-9708-019B960494DF}">
-                  <a14:hiddenLine xmlns:a14="http://schemas.microsoft.com/office/drawing/2010/main" xmlns="" w="9525">
+                  <a14:hiddenLine xmlns="" xmlns:a14="http://schemas.microsoft.com/office/drawing/2010/main" w="9525">
                     <a:solidFill>
                       <a:srgbClr val="000000"/>
                     </a:solidFill>
@@ -10642,7 +10642,7 @@
               </a:ln>
               <a:extLst>
                 <a:ext uri="{91240B29-F687-4f45-9708-019B960494DF}">
-                  <a14:hiddenLine xmlns:a14="http://schemas.microsoft.com/office/drawing/2010/main" xmlns="" w="9525">
+                  <a14:hiddenLine xmlns="" xmlns:a14="http://schemas.microsoft.com/office/drawing/2010/main" w="9525">
                     <a:solidFill>
                       <a:srgbClr val="000000"/>
                     </a:solidFill>
@@ -10732,7 +10732,7 @@
               </a:ln>
               <a:extLst>
                 <a:ext uri="{91240B29-F687-4f45-9708-019B960494DF}">
-                  <a14:hiddenLine xmlns:a14="http://schemas.microsoft.com/office/drawing/2010/main" xmlns="" w="9525">
+                  <a14:hiddenLine xmlns="" xmlns:a14="http://schemas.microsoft.com/office/drawing/2010/main" w="9525">
                     <a:solidFill>
                       <a:srgbClr val="000000"/>
                     </a:solidFill>
@@ -10822,7 +10822,7 @@
               </a:ln>
               <a:extLst>
                 <a:ext uri="{91240B29-F687-4f45-9708-019B960494DF}">
-                  <a14:hiddenLine xmlns:a14="http://schemas.microsoft.com/office/drawing/2010/main" xmlns="" w="9525">
+                  <a14:hiddenLine xmlns="" xmlns:a14="http://schemas.microsoft.com/office/drawing/2010/main" w="9525">
                     <a:solidFill>
                       <a:srgbClr val="000000"/>
                     </a:solidFill>
@@ -10887,7 +10887,7 @@
               </a:ln>
               <a:extLst>
                 <a:ext uri="{91240B29-F687-4f45-9708-019B960494DF}">
-                  <a14:hiddenLine xmlns:a14="http://schemas.microsoft.com/office/drawing/2010/main" xmlns="" w="9525">
+                  <a14:hiddenLine xmlns="" xmlns:a14="http://schemas.microsoft.com/office/drawing/2010/main" w="9525">
                     <a:solidFill>
                       <a:srgbClr val="000000"/>
                     </a:solidFill>
@@ -11007,7 +11007,7 @@
               </a:ln>
               <a:extLst>
                 <a:ext uri="{91240B29-F687-4f45-9708-019B960494DF}">
-                  <a14:hiddenLine xmlns:a14="http://schemas.microsoft.com/office/drawing/2010/main" xmlns="" w="9525">
+                  <a14:hiddenLine xmlns="" xmlns:a14="http://schemas.microsoft.com/office/drawing/2010/main" w="9525">
                     <a:solidFill>
                       <a:srgbClr val="000000"/>
                     </a:solidFill>
@@ -11105,7 +11105,7 @@
               </a:ln>
               <a:extLst>
                 <a:ext uri="{91240B29-F687-4f45-9708-019B960494DF}">
-                  <a14:hiddenLine xmlns:a14="http://schemas.microsoft.com/office/drawing/2010/main" xmlns="" w="9525">
+                  <a14:hiddenLine xmlns="" xmlns:a14="http://schemas.microsoft.com/office/drawing/2010/main" w="9525">
                     <a:solidFill>
                       <a:srgbClr val="000000"/>
                     </a:solidFill>
@@ -11220,7 +11220,7 @@
               </a:ln>
               <a:extLst>
                 <a:ext uri="{91240B29-F687-4f45-9708-019B960494DF}">
-                  <a14:hiddenLine xmlns:a14="http://schemas.microsoft.com/office/drawing/2010/main" xmlns="" w="9525">
+                  <a14:hiddenLine xmlns="" xmlns:a14="http://schemas.microsoft.com/office/drawing/2010/main" w="9525">
                     <a:solidFill>
                       <a:srgbClr val="000000"/>
                     </a:solidFill>
@@ -11310,7 +11310,7 @@
               </a:ln>
               <a:extLst>
                 <a:ext uri="{91240B29-F687-4f45-9708-019B960494DF}">
-                  <a14:hiddenLine xmlns:a14="http://schemas.microsoft.com/office/drawing/2010/main" xmlns="" w="9525">
+                  <a14:hiddenLine xmlns="" xmlns:a14="http://schemas.microsoft.com/office/drawing/2010/main" w="9525">
                     <a:solidFill>
                       <a:srgbClr val="000000"/>
                     </a:solidFill>
@@ -11375,7 +11375,7 @@
               </a:ln>
               <a:extLst>
                 <a:ext uri="{91240B29-F687-4f45-9708-019B960494DF}">
-                  <a14:hiddenLine xmlns:a14="http://schemas.microsoft.com/office/drawing/2010/main" xmlns="" w="9525">
+                  <a14:hiddenLine xmlns="" xmlns:a14="http://schemas.microsoft.com/office/drawing/2010/main" w="9525">
                     <a:solidFill>
                       <a:srgbClr val="000000"/>
                     </a:solidFill>
@@ -11465,7 +11465,7 @@
               </a:ln>
               <a:extLst>
                 <a:ext uri="{91240B29-F687-4f45-9708-019B960494DF}">
-                  <a14:hiddenLine xmlns:a14="http://schemas.microsoft.com/office/drawing/2010/main" xmlns="" w="9525">
+                  <a14:hiddenLine xmlns="" xmlns:a14="http://schemas.microsoft.com/office/drawing/2010/main" w="9525">
                     <a:solidFill>
                       <a:srgbClr val="000000"/>
                     </a:solidFill>
@@ -11533,7 +11533,7 @@
               </a:ln>
               <a:extLst>
                 <a:ext uri="{91240B29-F687-4f45-9708-019B960494DF}">
-                  <a14:hiddenLine xmlns:a14="http://schemas.microsoft.com/office/drawing/2010/main" xmlns="" w="9525">
+                  <a14:hiddenLine xmlns="" xmlns:a14="http://schemas.microsoft.com/office/drawing/2010/main" w="9525">
                     <a:solidFill>
                       <a:srgbClr val="000000"/>
                     </a:solidFill>
@@ -11623,7 +11623,7 @@
               </a:ln>
               <a:extLst>
                 <a:ext uri="{91240B29-F687-4f45-9708-019B960494DF}">
-                  <a14:hiddenLine xmlns:a14="http://schemas.microsoft.com/office/drawing/2010/main" xmlns="" w="9525">
+                  <a14:hiddenLine xmlns="" xmlns:a14="http://schemas.microsoft.com/office/drawing/2010/main" w="9525">
                     <a:solidFill>
                       <a:srgbClr val="000000"/>
                     </a:solidFill>
@@ -11691,7 +11691,7 @@
               </a:ln>
               <a:extLst>
                 <a:ext uri="{91240B29-F687-4f45-9708-019B960494DF}">
-                  <a14:hiddenLine xmlns:a14="http://schemas.microsoft.com/office/drawing/2010/main" xmlns="" w="9525">
+                  <a14:hiddenLine xmlns="" xmlns:a14="http://schemas.microsoft.com/office/drawing/2010/main" w="9525">
                     <a:solidFill>
                       <a:srgbClr val="000000"/>
                     </a:solidFill>
@@ -11781,7 +11781,7 @@
               </a:ln>
               <a:extLst>
                 <a:ext uri="{91240B29-F687-4f45-9708-019B960494DF}">
-                  <a14:hiddenLine xmlns:a14="http://schemas.microsoft.com/office/drawing/2010/main" xmlns="" w="9525">
+                  <a14:hiddenLine xmlns="" xmlns:a14="http://schemas.microsoft.com/office/drawing/2010/main" w="9525">
                     <a:solidFill>
                       <a:srgbClr val="000000"/>
                     </a:solidFill>
@@ -11815,7 +11815,7 @@
               </a:ln>
               <a:extLst>
                 <a:ext uri="{91240B29-F687-4f45-9708-019B960494DF}">
-                  <a14:hiddenLine xmlns:a14="http://schemas.microsoft.com/office/drawing/2010/main" xmlns="" w="9525">
+                  <a14:hiddenLine xmlns="" xmlns:a14="http://schemas.microsoft.com/office/drawing/2010/main" w="9525">
                     <a:solidFill>
                       <a:srgbClr val="000000"/>
                     </a:solidFill>
@@ -12507,7 +12507,12 @@
             <p:ph type="title"/>
           </p:nvPr>
         </p:nvSpPr>
-        <p:spPr/>
+        <p:spPr>
+          <a:xfrm>
+            <a:off x="1012826" y="221644"/>
+            <a:ext cx="9905998" cy="1478570"/>
+          </a:xfrm>
+        </p:spPr>
         <p:txBody>
           <a:bodyPr/>
           <a:lstStyle/>
@@ -12519,25 +12524,35 @@
           </a:p>
         </p:txBody>
       </p:sp>
-      <p:sp>
-        <p:nvSpPr>
-          <p:cNvPr id="3" name="Content Placeholder 2"/>
-          <p:cNvSpPr>
-            <a:spLocks noGrp="1"/>
-          </p:cNvSpPr>
+      <p:pic>
+        <p:nvPicPr>
+          <p:cNvPr id="5" name="Content Placeholder 4">
+            <a:extLst>
+              <a:ext uri="{FF2B5EF4-FFF2-40B4-BE49-F238E27FC236}">
+                <a16:creationId xmlns:a16="http://schemas.microsoft.com/office/drawing/2014/main" id="{63F00796-20CB-48AF-8ED2-C461703F82E3}"/>
+              </a:ext>
+            </a:extLst>
+          </p:cNvPr>
+          <p:cNvPicPr>
+            <a:picLocks noGrp="1" noChangeAspect="1"/>
+          </p:cNvPicPr>
           <p:nvPr>
             <p:ph idx="1"/>
           </p:nvPr>
-        </p:nvSpPr>
-        <p:spPr/>
-        <p:txBody>
-          <a:bodyPr/>
-          <a:lstStyle/>
-          <a:p>
-            <a:endParaRPr lang="en-US"/>
-          </a:p>
-        </p:txBody>
-      </p:sp>
+        </p:nvPicPr>
+        <p:blipFill>
+          <a:blip r:embed="rId2"/>
+          <a:stretch>
+            <a:fillRect/>
+          </a:stretch>
+        </p:blipFill>
+        <p:spPr>
+          <a:xfrm>
+            <a:off x="442913" y="1543050"/>
+            <a:ext cx="11458575" cy="4872038"/>
+          </a:xfrm>
+        </p:spPr>
+      </p:pic>
     </p:spTree>
     <p:extLst>
       <p:ext uri="{BB962C8B-B14F-4D97-AF65-F5344CB8AC3E}">

</xml_diff>